<commit_message>
Layout clean, Teil der besprochenen Änderungen schon angepasst
</commit_message>
<xml_diff>
--- a/FST17_M4_PosterHoch_T04.pptx
+++ b/FST17_M4_PosterHoch_T04.pptx
@@ -1604,7 +1604,7 @@
   <dgm:whole/>
   <dgm:extLst>
     <a:ext uri="http://schemas.microsoft.com/office/drawing/2008/diagram">
-      <dsp:dataModelExt xmlns:dsp="http://schemas.microsoft.com/office/drawing/2008/diagram" relId="rId24" minVer="http://schemas.openxmlformats.org/drawingml/2006/diagram"/>
+      <dsp:dataModelExt xmlns:dsp="http://schemas.microsoft.com/office/drawing/2008/diagram" relId="rId23" minVer="http://schemas.openxmlformats.org/drawingml/2006/diagram"/>
     </a:ext>
     <a:ext uri="{C62137D5-CB1D-491B-B009-E17868A290BF}">
       <dgm14:recolorImg xmlns:dgm14="http://schemas.microsoft.com/office/drawing/2010/diagram" val="1"/>
@@ -3992,7 +3992,7 @@
           <a:p>
             <a:fld id="{F8A2F35C-CEA7-4A41-A6EB-7B100C25E6CB}" type="datetimeFigureOut">
               <a:rPr lang="de-DE" smtClean="0"/>
-              <a:t>31.05.2017</a:t>
+              <a:t>02.06.2017</a:t>
             </a:fld>
             <a:endParaRPr lang="de-DE"/>
           </a:p>
@@ -4522,7 +4522,7 @@
           <a:p>
             <a:fld id="{CFEF8110-D74D-4E53-9D8A-42DFB11C9F8B}" type="datetimeFigureOut">
               <a:rPr lang="de-DE" smtClean="0"/>
-              <a:t>31.05.2017</a:t>
+              <a:t>02.06.2017</a:t>
             </a:fld>
             <a:endParaRPr lang="de-DE"/>
           </a:p>
@@ -4690,7 +4690,7 @@
           <a:p>
             <a:fld id="{CFEF8110-D74D-4E53-9D8A-42DFB11C9F8B}" type="datetimeFigureOut">
               <a:rPr lang="de-DE" smtClean="0"/>
-              <a:t>31.05.2017</a:t>
+              <a:t>02.06.2017</a:t>
             </a:fld>
             <a:endParaRPr lang="de-DE"/>
           </a:p>
@@ -4868,7 +4868,7 @@
           <a:p>
             <a:fld id="{CFEF8110-D74D-4E53-9D8A-42DFB11C9F8B}" type="datetimeFigureOut">
               <a:rPr lang="de-DE" smtClean="0"/>
-              <a:t>31.05.2017</a:t>
+              <a:t>02.06.2017</a:t>
             </a:fld>
             <a:endParaRPr lang="de-DE"/>
           </a:p>
@@ -5036,7 +5036,7 @@
           <a:p>
             <a:fld id="{CFEF8110-D74D-4E53-9D8A-42DFB11C9F8B}" type="datetimeFigureOut">
               <a:rPr lang="de-DE" smtClean="0"/>
-              <a:t>31.05.2017</a:t>
+              <a:t>02.06.2017</a:t>
             </a:fld>
             <a:endParaRPr lang="de-DE"/>
           </a:p>
@@ -5281,7 +5281,7 @@
           <a:p>
             <a:fld id="{CFEF8110-D74D-4E53-9D8A-42DFB11C9F8B}" type="datetimeFigureOut">
               <a:rPr lang="de-DE" smtClean="0"/>
-              <a:t>31.05.2017</a:t>
+              <a:t>02.06.2017</a:t>
             </a:fld>
             <a:endParaRPr lang="de-DE"/>
           </a:p>
@@ -5566,7 +5566,7 @@
           <a:p>
             <a:fld id="{CFEF8110-D74D-4E53-9D8A-42DFB11C9F8B}" type="datetimeFigureOut">
               <a:rPr lang="de-DE" smtClean="0"/>
-              <a:t>31.05.2017</a:t>
+              <a:t>02.06.2017</a:t>
             </a:fld>
             <a:endParaRPr lang="de-DE"/>
           </a:p>
@@ -5985,7 +5985,7 @@
           <a:p>
             <a:fld id="{CFEF8110-D74D-4E53-9D8A-42DFB11C9F8B}" type="datetimeFigureOut">
               <a:rPr lang="de-DE" smtClean="0"/>
-              <a:t>31.05.2017</a:t>
+              <a:t>02.06.2017</a:t>
             </a:fld>
             <a:endParaRPr lang="de-DE"/>
           </a:p>
@@ -6102,7 +6102,7 @@
           <a:p>
             <a:fld id="{CFEF8110-D74D-4E53-9D8A-42DFB11C9F8B}" type="datetimeFigureOut">
               <a:rPr lang="de-DE" smtClean="0"/>
-              <a:t>31.05.2017</a:t>
+              <a:t>02.06.2017</a:t>
             </a:fld>
             <a:endParaRPr lang="de-DE"/>
           </a:p>
@@ -6197,7 +6197,7 @@
           <a:p>
             <a:fld id="{CFEF8110-D74D-4E53-9D8A-42DFB11C9F8B}" type="datetimeFigureOut">
               <a:rPr lang="de-DE" smtClean="0"/>
-              <a:t>31.05.2017</a:t>
+              <a:t>02.06.2017</a:t>
             </a:fld>
             <a:endParaRPr lang="de-DE"/>
           </a:p>
@@ -6472,7 +6472,7 @@
           <a:p>
             <a:fld id="{CFEF8110-D74D-4E53-9D8A-42DFB11C9F8B}" type="datetimeFigureOut">
               <a:rPr lang="de-DE" smtClean="0"/>
-              <a:t>31.05.2017</a:t>
+              <a:t>02.06.2017</a:t>
             </a:fld>
             <a:endParaRPr lang="de-DE"/>
           </a:p>
@@ -6724,7 +6724,7 @@
           <a:p>
             <a:fld id="{CFEF8110-D74D-4E53-9D8A-42DFB11C9F8B}" type="datetimeFigureOut">
               <a:rPr lang="de-DE" smtClean="0"/>
-              <a:t>31.05.2017</a:t>
+              <a:t>02.06.2017</a:t>
             </a:fld>
             <a:endParaRPr lang="de-DE"/>
           </a:p>
@@ -6935,7 +6935,7 @@
           <a:p>
             <a:fld id="{CFEF8110-D74D-4E53-9D8A-42DFB11C9F8B}" type="datetimeFigureOut">
               <a:rPr lang="de-DE" smtClean="0"/>
-              <a:t>31.05.2017</a:t>
+              <a:t>02.06.2017</a:t>
             </a:fld>
             <a:endParaRPr lang="de-DE"/>
           </a:p>
@@ -7312,7 +7312,7 @@
       </p:grpSpPr>
       <p:pic>
         <p:nvPicPr>
-          <p:cNvPr id="59" name="Grafik 58"/>
+          <p:cNvPr id="51" name="Grafik 50"/>
           <p:cNvPicPr>
             <a:picLocks noChangeAspect="1"/>
           </p:cNvPicPr>
@@ -7332,8 +7332,8 @@
         </p:blipFill>
         <p:spPr>
           <a:xfrm>
-            <a:off x="252017" y="29446890"/>
-            <a:ext cx="20778870" cy="580228"/>
+            <a:off x="146104" y="29451322"/>
+            <a:ext cx="20950131" cy="610891"/>
           </a:xfrm>
           <a:prstGeom prst="rect">
             <a:avLst/>
@@ -7348,8 +7348,8 @@
         </p:nvSpPr>
         <p:spPr>
           <a:xfrm>
-            <a:off x="203866" y="19337795"/>
-            <a:ext cx="6657442" cy="9592685"/>
+            <a:off x="304333" y="18039231"/>
+            <a:ext cx="6657442" cy="10891249"/>
           </a:xfrm>
           <a:prstGeom prst="rect">
             <a:avLst/>
@@ -7396,8 +7396,8 @@
         </p:nvSpPr>
         <p:spPr>
           <a:xfrm>
-            <a:off x="7286285" y="19354581"/>
-            <a:ext cx="6657442" cy="9592685"/>
+            <a:off x="7292448" y="18039231"/>
+            <a:ext cx="6657442" cy="10890000"/>
           </a:xfrm>
           <a:prstGeom prst="rect">
             <a:avLst/>
@@ -7444,8 +7444,8 @@
         </p:nvSpPr>
         <p:spPr>
           <a:xfrm>
-            <a:off x="14373445" y="19337795"/>
-            <a:ext cx="6657442" cy="9592685"/>
+            <a:off x="14280563" y="18039231"/>
+            <a:ext cx="6657442" cy="10891249"/>
           </a:xfrm>
           <a:prstGeom prst="rect">
             <a:avLst/>
@@ -7480,7 +7480,7 @@
           <a:lstStyle/>
           <a:p>
             <a:pPr algn="ctr"/>
-            <a:endParaRPr lang="de-DE"/>
+            <a:endParaRPr lang="de-DE" dirty="0"/>
           </a:p>
         </p:txBody>
       </p:sp>
@@ -7492,8 +7492,8 @@
         </p:nvSpPr>
         <p:spPr>
           <a:xfrm>
-            <a:off x="380587" y="14617675"/>
-            <a:ext cx="14201022" cy="3236927"/>
+            <a:off x="253901" y="13050861"/>
+            <a:ext cx="14026662" cy="3236927"/>
           </a:xfrm>
           <a:prstGeom prst="rect">
             <a:avLst/>
@@ -7572,8 +7572,8 @@
         </p:nvSpPr>
         <p:spPr>
           <a:xfrm>
-            <a:off x="3674036" y="29275552"/>
-            <a:ext cx="12259563" cy="916396"/>
+            <a:off x="4567946" y="29275552"/>
+            <a:ext cx="12106446" cy="916396"/>
           </a:xfrm>
         </p:spPr>
         <p:txBody>
@@ -7604,7 +7604,7 @@
         </p:nvSpPr>
         <p:spPr>
           <a:xfrm>
-            <a:off x="368559" y="12025387"/>
+            <a:off x="242216" y="11934024"/>
             <a:ext cx="19187102" cy="1028647"/>
           </a:xfrm>
           <a:prstGeom prst="rect">
@@ -7649,8 +7649,8 @@
         </p:nvSpPr>
         <p:spPr>
           <a:xfrm>
-            <a:off x="15013657" y="3271867"/>
-            <a:ext cx="5861032" cy="4361032"/>
+            <a:off x="14826237" y="3690690"/>
+            <a:ext cx="5199354" cy="3931569"/>
           </a:xfrm>
           <a:prstGeom prst="rect">
             <a:avLst/>
@@ -7661,216 +7661,124 @@
           </a:ln>
         </p:spPr>
         <p:txBody>
-          <a:bodyPr wrap="square" numCol="2" spcCol="504000" rtlCol="0">
+          <a:bodyPr wrap="square" numCol="1" spcCol="504000" rtlCol="0">
             <a:noAutofit/>
           </a:bodyPr>
           <a:lstStyle/>
           <a:p>
-            <a:r>
-              <a:rPr lang="de-DE" sz="3200" b="1" dirty="0">
+            <a:pPr>
+              <a:lnSpc>
+                <a:spcPct val="150000"/>
+              </a:lnSpc>
+            </a:pPr>
+            <a:r>
+              <a:rPr lang="de-DE" sz="2800" dirty="0">
                 <a:latin typeface="Arial" panose="020B0604020202020204" pitchFamily="34" charset="0"/>
                 <a:cs typeface="Arial" panose="020B0604020202020204" pitchFamily="34" charset="0"/>
               </a:rPr>
-              <a:t>Anbieter</a:t>
-            </a:r>
-          </a:p>
-          <a:p>
-            <a:r>
-              <a:rPr lang="de-DE" sz="3200" dirty="0">
+              <a:t>Beitz, Julia</a:t>
+            </a:r>
+          </a:p>
+          <a:p>
+            <a:pPr>
+              <a:lnSpc>
+                <a:spcPct val="150000"/>
+              </a:lnSpc>
+            </a:pPr>
+            <a:r>
+              <a:rPr lang="de-DE" sz="2800" dirty="0">
                 <a:latin typeface="Arial" panose="020B0604020202020204" pitchFamily="34" charset="0"/>
                 <a:cs typeface="Arial" panose="020B0604020202020204" pitchFamily="34" charset="0"/>
               </a:rPr>
-              <a:t>Beitz </a:t>
-            </a:r>
-          </a:p>
-          <a:p>
-            <a:r>
-              <a:rPr lang="de-DE" sz="3200" dirty="0">
-                <a:latin typeface="Arial" panose="020B0604020202020204" pitchFamily="34" charset="0"/>
-                <a:cs typeface="Arial" panose="020B0604020202020204" pitchFamily="34" charset="0"/>
-              </a:rPr>
-              <a:t>Billerbeck</a:t>
-            </a:r>
-          </a:p>
-          <a:p>
-            <a:r>
-              <a:rPr lang="de-DE" sz="3200" dirty="0" err="1">
+              <a:t>Billerbeck, Kerstin</a:t>
+            </a:r>
+          </a:p>
+          <a:p>
+            <a:pPr>
+              <a:lnSpc>
+                <a:spcPct val="150000"/>
+              </a:lnSpc>
+            </a:pPr>
+            <a:r>
+              <a:rPr lang="de-DE" sz="2800" dirty="0" err="1">
                 <a:latin typeface="Arial" panose="020B0604020202020204" pitchFamily="34" charset="0"/>
                 <a:cs typeface="Arial" panose="020B0604020202020204" pitchFamily="34" charset="0"/>
               </a:rPr>
               <a:t>Brecklinghaus</a:t>
             </a:r>
-            <a:endParaRPr lang="de-DE" sz="3200" dirty="0">
-              <a:latin typeface="Arial" panose="020B0604020202020204" pitchFamily="34" charset="0"/>
-              <a:cs typeface="Arial" panose="020B0604020202020204" pitchFamily="34" charset="0"/>
-            </a:endParaRPr>
-          </a:p>
-          <a:p>
-            <a:r>
-              <a:rPr lang="de-DE" sz="3200" dirty="0" err="1">
+            <a:r>
+              <a:rPr lang="de-DE" sz="2800" dirty="0">
+                <a:latin typeface="Arial" panose="020B0604020202020204" pitchFamily="34" charset="0"/>
+                <a:cs typeface="Arial" panose="020B0604020202020204" pitchFamily="34" charset="0"/>
+              </a:rPr>
+              <a:t>, Stephan</a:t>
+            </a:r>
+          </a:p>
+          <a:p>
+            <a:pPr>
+              <a:lnSpc>
+                <a:spcPct val="150000"/>
+              </a:lnSpc>
+            </a:pPr>
+            <a:r>
+              <a:rPr lang="de-DE" sz="2800" dirty="0" err="1">
                 <a:latin typeface="Arial" panose="020B0604020202020204" pitchFamily="34" charset="0"/>
                 <a:cs typeface="Arial" panose="020B0604020202020204" pitchFamily="34" charset="0"/>
               </a:rPr>
               <a:t>Ciecior</a:t>
             </a:r>
-            <a:endParaRPr lang="de-DE" sz="3200" dirty="0">
-              <a:latin typeface="Arial" panose="020B0604020202020204" pitchFamily="34" charset="0"/>
-              <a:cs typeface="Arial" panose="020B0604020202020204" pitchFamily="34" charset="0"/>
-            </a:endParaRPr>
-          </a:p>
-          <a:p>
-            <a:r>
-              <a:rPr lang="de-DE" sz="3200" dirty="0" err="1">
+            <a:r>
+              <a:rPr lang="de-DE" sz="2800" dirty="0">
+                <a:latin typeface="Arial" panose="020B0604020202020204" pitchFamily="34" charset="0"/>
+                <a:cs typeface="Arial" panose="020B0604020202020204" pitchFamily="34" charset="0"/>
+              </a:rPr>
+              <a:t>, Peter</a:t>
+            </a:r>
+          </a:p>
+          <a:p>
+            <a:pPr>
+              <a:lnSpc>
+                <a:spcPct val="150000"/>
+              </a:lnSpc>
+            </a:pPr>
+            <a:r>
+              <a:rPr lang="de-DE" sz="2800" dirty="0" err="1">
                 <a:latin typeface="Arial" panose="020B0604020202020204" pitchFamily="34" charset="0"/>
                 <a:cs typeface="Arial" panose="020B0604020202020204" pitchFamily="34" charset="0"/>
               </a:rPr>
               <a:t>Mergenbaum</a:t>
             </a:r>
-            <a:endParaRPr lang="de-DE" sz="3200" dirty="0">
-              <a:latin typeface="Arial" panose="020B0604020202020204" pitchFamily="34" charset="0"/>
-              <a:cs typeface="Arial" panose="020B0604020202020204" pitchFamily="34" charset="0"/>
-            </a:endParaRPr>
-          </a:p>
-          <a:p>
-            <a:r>
-              <a:rPr lang="de-DE" sz="3200" dirty="0" err="1">
+            <a:r>
+              <a:rPr lang="de-DE" sz="2800" dirty="0">
+                <a:latin typeface="Arial" panose="020B0604020202020204" pitchFamily="34" charset="0"/>
+                <a:cs typeface="Arial" panose="020B0604020202020204" pitchFamily="34" charset="0"/>
+              </a:rPr>
+              <a:t>, Andrea</a:t>
+            </a:r>
+          </a:p>
+          <a:p>
+            <a:pPr>
+              <a:lnSpc>
+                <a:spcPct val="150000"/>
+              </a:lnSpc>
+            </a:pPr>
+            <a:r>
+              <a:rPr lang="de-DE" sz="2800" dirty="0" err="1">
                 <a:latin typeface="Arial" panose="020B0604020202020204" pitchFamily="34" charset="0"/>
                 <a:cs typeface="Arial" panose="020B0604020202020204" pitchFamily="34" charset="0"/>
               </a:rPr>
               <a:t>Vranken</a:t>
             </a:r>
-            <a:endParaRPr lang="de-DE" sz="3200" dirty="0">
-              <a:latin typeface="Arial" panose="020B0604020202020204" pitchFamily="34" charset="0"/>
-              <a:cs typeface="Arial" panose="020B0604020202020204" pitchFamily="34" charset="0"/>
-            </a:endParaRPr>
-          </a:p>
-          <a:p>
-            <a:endParaRPr lang="de-DE" sz="3200" dirty="0">
-              <a:latin typeface="Arial" panose="020B0604020202020204" pitchFamily="34" charset="0"/>
-              <a:cs typeface="Arial" panose="020B0604020202020204" pitchFamily="34" charset="0"/>
-            </a:endParaRPr>
-          </a:p>
-          <a:p>
-            <a:endParaRPr lang="de-DE" sz="3200" dirty="0">
-              <a:latin typeface="Arial" panose="020B0604020202020204" pitchFamily="34" charset="0"/>
-              <a:cs typeface="Arial" panose="020B0604020202020204" pitchFamily="34" charset="0"/>
-            </a:endParaRPr>
-          </a:p>
-          <a:p>
-            <a:r>
-              <a:rPr lang="de-DE" sz="3200" dirty="0">
+            <a:r>
+              <a:rPr lang="de-DE" sz="2800" dirty="0">
                 <a:latin typeface="Arial" panose="020B0604020202020204" pitchFamily="34" charset="0"/>
                 <a:cs typeface="Arial" panose="020B0604020202020204" pitchFamily="34" charset="0"/>
               </a:rPr>
-              <a:t>Julia</a:t>
-            </a:r>
-          </a:p>
-          <a:p>
-            <a:r>
-              <a:rPr lang="de-DE" sz="3200" dirty="0">
-                <a:latin typeface="Arial" panose="020B0604020202020204" pitchFamily="34" charset="0"/>
-                <a:cs typeface="Arial" panose="020B0604020202020204" pitchFamily="34" charset="0"/>
-              </a:rPr>
-              <a:t>Kerstin</a:t>
-            </a:r>
-          </a:p>
-          <a:p>
-            <a:r>
-              <a:rPr lang="de-DE" sz="3200" dirty="0">
-                <a:latin typeface="Arial" panose="020B0604020202020204" pitchFamily="34" charset="0"/>
-                <a:cs typeface="Arial" panose="020B0604020202020204" pitchFamily="34" charset="0"/>
-              </a:rPr>
-              <a:t>Stephan</a:t>
-            </a:r>
-          </a:p>
-          <a:p>
-            <a:r>
-              <a:rPr lang="de-DE" sz="3200" dirty="0">
-                <a:latin typeface="Arial" panose="020B0604020202020204" pitchFamily="34" charset="0"/>
-                <a:cs typeface="Arial" panose="020B0604020202020204" pitchFamily="34" charset="0"/>
-              </a:rPr>
-              <a:t>Peter</a:t>
-            </a:r>
-          </a:p>
-          <a:p>
-            <a:r>
-              <a:rPr lang="de-DE" sz="3200" dirty="0">
-                <a:latin typeface="Arial" panose="020B0604020202020204" pitchFamily="34" charset="0"/>
-                <a:cs typeface="Arial" panose="020B0604020202020204" pitchFamily="34" charset="0"/>
-              </a:rPr>
-              <a:t>Andrea</a:t>
-            </a:r>
-          </a:p>
-          <a:p>
-            <a:r>
-              <a:rPr lang="de-DE" sz="3200" dirty="0">
-                <a:latin typeface="Arial" panose="020B0604020202020204" pitchFamily="34" charset="0"/>
-                <a:cs typeface="Arial" panose="020B0604020202020204" pitchFamily="34" charset="0"/>
-              </a:rPr>
-              <a:t>Sebastian</a:t>
+              <a:t>, Sebastian</a:t>
             </a:r>
           </a:p>
         </p:txBody>
       </p:sp>
-      <p:pic>
-        <p:nvPicPr>
-          <p:cNvPr id="1034" name="Picture 10"/>
-          <p:cNvPicPr>
-            <a:picLocks noChangeAspect="1" noChangeArrowheads="1"/>
-          </p:cNvPicPr>
-          <p:nvPr/>
-        </p:nvPicPr>
-        <p:blipFill>
-          <a:blip r:embed="rId4">
-            <a:extLst>
-              <a:ext uri="{28A0092B-C50C-407E-A947-70E740481C1C}">
-                <a14:useLocalDpi xmlns:a14="http://schemas.microsoft.com/office/drawing/2010/main" val="0"/>
-              </a:ext>
-            </a:extLst>
-          </a:blip>
-          <a:srcRect/>
-          <a:stretch>
-            <a:fillRect/>
-          </a:stretch>
-        </p:blipFill>
-        <p:spPr bwMode="auto">
-          <a:xfrm>
-            <a:off x="14556396" y="24956284"/>
-            <a:ext cx="4572000" cy="3429001"/>
-          </a:xfrm>
-          <a:prstGeom prst="rect">
-            <a:avLst/>
-          </a:prstGeom>
-          <a:noFill/>
-          <a:ln w="9525">
-            <a:solidFill>
-              <a:schemeClr val="tx1"/>
-            </a:solidFill>
-            <a:miter lim="800000"/>
-            <a:headEnd/>
-            <a:tailEnd/>
-          </a:ln>
-          <a:effectLst/>
-          <a:extLst>
-            <a:ext uri="{909E8E84-426E-40DD-AFC4-6F175D3DCCD1}">
-              <a14:hiddenFill xmlns:a14="http://schemas.microsoft.com/office/drawing/2010/main">
-                <a:solidFill>
-                  <a:schemeClr val="accent1"/>
-                </a:solidFill>
-              </a14:hiddenFill>
-            </a:ext>
-            <a:ext uri="{AF507438-7753-43E0-B8FC-AC1667EBCBE1}">
-              <a14:hiddenEffects xmlns:a14="http://schemas.microsoft.com/office/drawing/2010/main">
-                <a:effectLst>
-                  <a:outerShdw dist="35921" dir="2700000" algn="ctr" rotWithShape="0">
-                    <a:schemeClr val="bg2"/>
-                  </a:outerShdw>
-                </a:effectLst>
-              </a14:hiddenEffects>
-            </a:ext>
-          </a:extLst>
-        </p:spPr>
-      </p:pic>
       <p:sp>
         <p:nvSpPr>
           <p:cNvPr id="5" name="Rechteck 4"/>
@@ -7879,7 +7787,7 @@
         </p:nvSpPr>
         <p:spPr>
           <a:xfrm>
-            <a:off x="215178" y="19354583"/>
+            <a:off x="470465" y="18080498"/>
             <a:ext cx="4402167" cy="984885"/>
           </a:xfrm>
           <a:prstGeom prst="rect">
@@ -7917,7 +7825,7 @@
         </p:nvSpPr>
         <p:spPr>
           <a:xfrm>
-            <a:off x="7324860" y="19305719"/>
+            <a:off x="7460878" y="18077411"/>
             <a:ext cx="3905236" cy="984885"/>
           </a:xfrm>
           <a:prstGeom prst="rect">
@@ -7955,7 +7863,7 @@
         </p:nvSpPr>
         <p:spPr>
           <a:xfrm>
-            <a:off x="14429479" y="19337795"/>
+            <a:off x="14414066" y="18080498"/>
             <a:ext cx="4318811" cy="984885"/>
           </a:xfrm>
           <a:prstGeom prst="rect">
@@ -7993,8 +7901,8 @@
         </p:nvSpPr>
         <p:spPr>
           <a:xfrm>
-            <a:off x="12089818" y="20515391"/>
-            <a:ext cx="2045694" cy="4524315"/>
+            <a:off x="7466663" y="24408191"/>
+            <a:ext cx="6466671" cy="369332"/>
           </a:xfrm>
           <a:prstGeom prst="rect">
             <a:avLst/>
@@ -8007,16 +7915,6 @@
           <a:lstStyle/>
           <a:p>
             <a:r>
-              <a:rPr lang="de-DE" sz="1800" dirty="0" err="1">
-                <a:solidFill>
-                  <a:prstClr val="black"/>
-                </a:solidFill>
-                <a:latin typeface="Arial" panose="020B0604020202020204" pitchFamily="34" charset="0"/>
-                <a:cs typeface="Arial" panose="020B0604020202020204" pitchFamily="34" charset="0"/>
-              </a:rPr>
-              <a:t>Lorem</a:t>
-            </a:r>
-            <a:r>
               <a:rPr lang="de-DE" sz="1800" dirty="0">
                 <a:solidFill>
                   <a:prstClr val="black"/>
@@ -8024,607 +7922,7 @@
                 <a:latin typeface="Arial" panose="020B0604020202020204" pitchFamily="34" charset="0"/>
                 <a:cs typeface="Arial" panose="020B0604020202020204" pitchFamily="34" charset="0"/>
               </a:rPr>
-              <a:t> </a:t>
-            </a:r>
-            <a:r>
-              <a:rPr lang="de-DE" sz="1800" dirty="0" err="1">
-                <a:solidFill>
-                  <a:prstClr val="black"/>
-                </a:solidFill>
-                <a:latin typeface="Arial" panose="020B0604020202020204" pitchFamily="34" charset="0"/>
-                <a:cs typeface="Arial" panose="020B0604020202020204" pitchFamily="34" charset="0"/>
-              </a:rPr>
-              <a:t>ipsum</a:t>
-            </a:r>
-            <a:r>
-              <a:rPr lang="de-DE" sz="1800" dirty="0">
-                <a:solidFill>
-                  <a:prstClr val="black"/>
-                </a:solidFill>
-                <a:latin typeface="Arial" panose="020B0604020202020204" pitchFamily="34" charset="0"/>
-                <a:cs typeface="Arial" panose="020B0604020202020204" pitchFamily="34" charset="0"/>
-              </a:rPr>
-              <a:t> </a:t>
-            </a:r>
-            <a:r>
-              <a:rPr lang="de-DE" sz="1800" dirty="0" err="1">
-                <a:solidFill>
-                  <a:prstClr val="black"/>
-                </a:solidFill>
-                <a:latin typeface="Arial" panose="020B0604020202020204" pitchFamily="34" charset="0"/>
-                <a:cs typeface="Arial" panose="020B0604020202020204" pitchFamily="34" charset="0"/>
-              </a:rPr>
-              <a:t>dolor</a:t>
-            </a:r>
-            <a:r>
-              <a:rPr lang="de-DE" sz="1800" dirty="0">
-                <a:solidFill>
-                  <a:prstClr val="black"/>
-                </a:solidFill>
-                <a:latin typeface="Arial" panose="020B0604020202020204" pitchFamily="34" charset="0"/>
-                <a:cs typeface="Arial" panose="020B0604020202020204" pitchFamily="34" charset="0"/>
-              </a:rPr>
-              <a:t> </a:t>
-            </a:r>
-            <a:r>
-              <a:rPr lang="de-DE" sz="1800" dirty="0" err="1">
-                <a:solidFill>
-                  <a:prstClr val="black"/>
-                </a:solidFill>
-                <a:latin typeface="Arial" panose="020B0604020202020204" pitchFamily="34" charset="0"/>
-                <a:cs typeface="Arial" panose="020B0604020202020204" pitchFamily="34" charset="0"/>
-              </a:rPr>
-              <a:t>sit</a:t>
-            </a:r>
-            <a:r>
-              <a:rPr lang="de-DE" sz="1800" dirty="0">
-                <a:solidFill>
-                  <a:prstClr val="black"/>
-                </a:solidFill>
-                <a:latin typeface="Arial" panose="020B0604020202020204" pitchFamily="34" charset="0"/>
-                <a:cs typeface="Arial" panose="020B0604020202020204" pitchFamily="34" charset="0"/>
-              </a:rPr>
-              <a:t> </a:t>
-            </a:r>
-            <a:r>
-              <a:rPr lang="de-DE" sz="1800" dirty="0" err="1">
-                <a:solidFill>
-                  <a:prstClr val="black"/>
-                </a:solidFill>
-                <a:latin typeface="Arial" panose="020B0604020202020204" pitchFamily="34" charset="0"/>
-                <a:cs typeface="Arial" panose="020B0604020202020204" pitchFamily="34" charset="0"/>
-              </a:rPr>
-              <a:t>amet</a:t>
-            </a:r>
-            <a:r>
-              <a:rPr lang="de-DE" sz="1800" dirty="0">
-                <a:solidFill>
-                  <a:prstClr val="black"/>
-                </a:solidFill>
-                <a:latin typeface="Arial" panose="020B0604020202020204" pitchFamily="34" charset="0"/>
-                <a:cs typeface="Arial" panose="020B0604020202020204" pitchFamily="34" charset="0"/>
-              </a:rPr>
-              <a:t>, </a:t>
-            </a:r>
-            <a:r>
-              <a:rPr lang="de-DE" sz="1800" dirty="0" err="1">
-                <a:solidFill>
-                  <a:prstClr val="black"/>
-                </a:solidFill>
-                <a:latin typeface="Arial" panose="020B0604020202020204" pitchFamily="34" charset="0"/>
-                <a:cs typeface="Arial" panose="020B0604020202020204" pitchFamily="34" charset="0"/>
-              </a:rPr>
-              <a:t>consectetur</a:t>
-            </a:r>
-            <a:r>
-              <a:rPr lang="de-DE" sz="1800" dirty="0">
-                <a:solidFill>
-                  <a:prstClr val="black"/>
-                </a:solidFill>
-                <a:latin typeface="Arial" panose="020B0604020202020204" pitchFamily="34" charset="0"/>
-                <a:cs typeface="Arial" panose="020B0604020202020204" pitchFamily="34" charset="0"/>
-              </a:rPr>
-              <a:t> </a:t>
-            </a:r>
-            <a:r>
-              <a:rPr lang="de-DE" sz="1800" dirty="0" err="1">
-                <a:solidFill>
-                  <a:prstClr val="black"/>
-                </a:solidFill>
-                <a:latin typeface="Arial" panose="020B0604020202020204" pitchFamily="34" charset="0"/>
-                <a:cs typeface="Arial" panose="020B0604020202020204" pitchFamily="34" charset="0"/>
-              </a:rPr>
-              <a:t>adipiscing</a:t>
-            </a:r>
-            <a:r>
-              <a:rPr lang="de-DE" sz="1800" dirty="0">
-                <a:solidFill>
-                  <a:prstClr val="black"/>
-                </a:solidFill>
-                <a:latin typeface="Arial" panose="020B0604020202020204" pitchFamily="34" charset="0"/>
-                <a:cs typeface="Arial" panose="020B0604020202020204" pitchFamily="34" charset="0"/>
-              </a:rPr>
-              <a:t> </a:t>
-            </a:r>
-            <a:r>
-              <a:rPr lang="de-DE" sz="1800" dirty="0" err="1">
-                <a:solidFill>
-                  <a:prstClr val="black"/>
-                </a:solidFill>
-                <a:latin typeface="Arial" panose="020B0604020202020204" pitchFamily="34" charset="0"/>
-                <a:cs typeface="Arial" panose="020B0604020202020204" pitchFamily="34" charset="0"/>
-              </a:rPr>
-              <a:t>elit</a:t>
-            </a:r>
-            <a:r>
-              <a:rPr lang="de-DE" sz="1800" dirty="0">
-                <a:solidFill>
-                  <a:prstClr val="black"/>
-                </a:solidFill>
-                <a:latin typeface="Arial" panose="020B0604020202020204" pitchFamily="34" charset="0"/>
-                <a:cs typeface="Arial" panose="020B0604020202020204" pitchFamily="34" charset="0"/>
-              </a:rPr>
-              <a:t>. Nam </a:t>
-            </a:r>
-            <a:r>
-              <a:rPr lang="de-DE" sz="1800" dirty="0" err="1">
-                <a:solidFill>
-                  <a:prstClr val="black"/>
-                </a:solidFill>
-                <a:latin typeface="Arial" panose="020B0604020202020204" pitchFamily="34" charset="0"/>
-                <a:cs typeface="Arial" panose="020B0604020202020204" pitchFamily="34" charset="0"/>
-              </a:rPr>
-              <a:t>sodales</a:t>
-            </a:r>
-            <a:r>
-              <a:rPr lang="de-DE" sz="1800" dirty="0">
-                <a:solidFill>
-                  <a:prstClr val="black"/>
-                </a:solidFill>
-                <a:latin typeface="Arial" panose="020B0604020202020204" pitchFamily="34" charset="0"/>
-                <a:cs typeface="Arial" panose="020B0604020202020204" pitchFamily="34" charset="0"/>
-              </a:rPr>
-              <a:t> </a:t>
-            </a:r>
-            <a:r>
-              <a:rPr lang="de-DE" sz="1800" dirty="0" err="1">
-                <a:solidFill>
-                  <a:prstClr val="black"/>
-                </a:solidFill>
-                <a:latin typeface="Arial" panose="020B0604020202020204" pitchFamily="34" charset="0"/>
-                <a:cs typeface="Arial" panose="020B0604020202020204" pitchFamily="34" charset="0"/>
-              </a:rPr>
-              <a:t>dignissim</a:t>
-            </a:r>
-            <a:r>
-              <a:rPr lang="de-DE" sz="1800" dirty="0">
-                <a:solidFill>
-                  <a:prstClr val="black"/>
-                </a:solidFill>
-                <a:latin typeface="Arial" panose="020B0604020202020204" pitchFamily="34" charset="0"/>
-                <a:cs typeface="Arial" panose="020B0604020202020204" pitchFamily="34" charset="0"/>
-              </a:rPr>
-              <a:t> </a:t>
-            </a:r>
-            <a:r>
-              <a:rPr lang="de-DE" sz="1800" dirty="0" err="1">
-                <a:solidFill>
-                  <a:prstClr val="black"/>
-                </a:solidFill>
-                <a:latin typeface="Arial" panose="020B0604020202020204" pitchFamily="34" charset="0"/>
-                <a:cs typeface="Arial" panose="020B0604020202020204" pitchFamily="34" charset="0"/>
-              </a:rPr>
-              <a:t>eros</a:t>
-            </a:r>
-            <a:r>
-              <a:rPr lang="de-DE" sz="1800" dirty="0">
-                <a:solidFill>
-                  <a:prstClr val="black"/>
-                </a:solidFill>
-                <a:latin typeface="Arial" panose="020B0604020202020204" pitchFamily="34" charset="0"/>
-                <a:cs typeface="Arial" panose="020B0604020202020204" pitchFamily="34" charset="0"/>
-              </a:rPr>
-              <a:t>, </a:t>
-            </a:r>
-            <a:r>
-              <a:rPr lang="de-DE" sz="1800" dirty="0" err="1">
-                <a:solidFill>
-                  <a:prstClr val="black"/>
-                </a:solidFill>
-                <a:latin typeface="Arial" panose="020B0604020202020204" pitchFamily="34" charset="0"/>
-                <a:cs typeface="Arial" panose="020B0604020202020204" pitchFamily="34" charset="0"/>
-              </a:rPr>
-              <a:t>rutrum</a:t>
-            </a:r>
-            <a:r>
-              <a:rPr lang="de-DE" sz="1800" dirty="0">
-                <a:solidFill>
-                  <a:prstClr val="black"/>
-                </a:solidFill>
-                <a:latin typeface="Arial" panose="020B0604020202020204" pitchFamily="34" charset="0"/>
-                <a:cs typeface="Arial" panose="020B0604020202020204" pitchFamily="34" charset="0"/>
-              </a:rPr>
-              <a:t> </a:t>
-            </a:r>
-            <a:r>
-              <a:rPr lang="de-DE" sz="1800" dirty="0" err="1">
-                <a:solidFill>
-                  <a:prstClr val="black"/>
-                </a:solidFill>
-                <a:latin typeface="Arial" panose="020B0604020202020204" pitchFamily="34" charset="0"/>
-                <a:cs typeface="Arial" panose="020B0604020202020204" pitchFamily="34" charset="0"/>
-              </a:rPr>
-              <a:t>gravida</a:t>
-            </a:r>
-            <a:r>
-              <a:rPr lang="de-DE" sz="1800" dirty="0">
-                <a:solidFill>
-                  <a:prstClr val="black"/>
-                </a:solidFill>
-                <a:latin typeface="Arial" panose="020B0604020202020204" pitchFamily="34" charset="0"/>
-                <a:cs typeface="Arial" panose="020B0604020202020204" pitchFamily="34" charset="0"/>
-              </a:rPr>
-              <a:t> </a:t>
-            </a:r>
-            <a:r>
-              <a:rPr lang="de-DE" sz="1800" dirty="0" err="1">
-                <a:solidFill>
-                  <a:prstClr val="black"/>
-                </a:solidFill>
-                <a:latin typeface="Arial" panose="020B0604020202020204" pitchFamily="34" charset="0"/>
-                <a:cs typeface="Arial" panose="020B0604020202020204" pitchFamily="34" charset="0"/>
-              </a:rPr>
-              <a:t>ipsum</a:t>
-            </a:r>
-            <a:r>
-              <a:rPr lang="de-DE" sz="1800" dirty="0">
-                <a:solidFill>
-                  <a:prstClr val="black"/>
-                </a:solidFill>
-                <a:latin typeface="Arial" panose="020B0604020202020204" pitchFamily="34" charset="0"/>
-                <a:cs typeface="Arial" panose="020B0604020202020204" pitchFamily="34" charset="0"/>
-              </a:rPr>
-              <a:t> </a:t>
-            </a:r>
-            <a:r>
-              <a:rPr lang="de-DE" sz="1800" dirty="0" err="1">
-                <a:solidFill>
-                  <a:prstClr val="black"/>
-                </a:solidFill>
-                <a:latin typeface="Arial" panose="020B0604020202020204" pitchFamily="34" charset="0"/>
-                <a:cs typeface="Arial" panose="020B0604020202020204" pitchFamily="34" charset="0"/>
-              </a:rPr>
-              <a:t>blandit</a:t>
-            </a:r>
-            <a:r>
-              <a:rPr lang="de-DE" sz="1800" dirty="0">
-                <a:solidFill>
-                  <a:prstClr val="black"/>
-                </a:solidFill>
-                <a:latin typeface="Arial" panose="020B0604020202020204" pitchFamily="34" charset="0"/>
-                <a:cs typeface="Arial" panose="020B0604020202020204" pitchFamily="34" charset="0"/>
-              </a:rPr>
-              <a:t> </a:t>
-            </a:r>
-            <a:r>
-              <a:rPr lang="de-DE" sz="1800" dirty="0" err="1">
-                <a:solidFill>
-                  <a:prstClr val="black"/>
-                </a:solidFill>
-                <a:latin typeface="Arial" panose="020B0604020202020204" pitchFamily="34" charset="0"/>
-                <a:cs typeface="Arial" panose="020B0604020202020204" pitchFamily="34" charset="0"/>
-              </a:rPr>
-              <a:t>vitae</a:t>
-            </a:r>
-            <a:r>
-              <a:rPr lang="de-DE" sz="1800" dirty="0">
-                <a:solidFill>
-                  <a:prstClr val="black"/>
-                </a:solidFill>
-                <a:latin typeface="Arial" panose="020B0604020202020204" pitchFamily="34" charset="0"/>
-                <a:cs typeface="Arial" panose="020B0604020202020204" pitchFamily="34" charset="0"/>
-              </a:rPr>
-              <a:t>. </a:t>
-            </a:r>
-            <a:r>
-              <a:rPr lang="de-DE" sz="1800" dirty="0" err="1">
-                <a:solidFill>
-                  <a:prstClr val="black"/>
-                </a:solidFill>
-                <a:latin typeface="Arial" panose="020B0604020202020204" pitchFamily="34" charset="0"/>
-                <a:cs typeface="Arial" panose="020B0604020202020204" pitchFamily="34" charset="0"/>
-              </a:rPr>
-              <a:t>Quisque</a:t>
-            </a:r>
-            <a:r>
-              <a:rPr lang="de-DE" sz="1800" dirty="0">
-                <a:solidFill>
-                  <a:prstClr val="black"/>
-                </a:solidFill>
-                <a:latin typeface="Arial" panose="020B0604020202020204" pitchFamily="34" charset="0"/>
-                <a:cs typeface="Arial" panose="020B0604020202020204" pitchFamily="34" charset="0"/>
-              </a:rPr>
-              <a:t> </a:t>
-            </a:r>
-            <a:r>
-              <a:rPr lang="de-DE" sz="1800" dirty="0" err="1">
-                <a:solidFill>
-                  <a:prstClr val="black"/>
-                </a:solidFill>
-                <a:latin typeface="Arial" panose="020B0604020202020204" pitchFamily="34" charset="0"/>
-                <a:cs typeface="Arial" panose="020B0604020202020204" pitchFamily="34" charset="0"/>
-              </a:rPr>
-              <a:t>adipiscing</a:t>
-            </a:r>
-            <a:r>
-              <a:rPr lang="de-DE" sz="1800" dirty="0">
-                <a:solidFill>
-                  <a:prstClr val="black"/>
-                </a:solidFill>
-                <a:latin typeface="Arial" panose="020B0604020202020204" pitchFamily="34" charset="0"/>
-                <a:cs typeface="Arial" panose="020B0604020202020204" pitchFamily="34" charset="0"/>
-              </a:rPr>
-              <a:t>, </a:t>
-            </a:r>
-            <a:r>
-              <a:rPr lang="de-DE" sz="1800" dirty="0" err="1">
-                <a:solidFill>
-                  <a:prstClr val="black"/>
-                </a:solidFill>
-                <a:latin typeface="Arial" panose="020B0604020202020204" pitchFamily="34" charset="0"/>
-                <a:cs typeface="Arial" panose="020B0604020202020204" pitchFamily="34" charset="0"/>
-              </a:rPr>
-              <a:t>dui</a:t>
-            </a:r>
-            <a:r>
-              <a:rPr lang="de-DE" sz="1800" dirty="0">
-                <a:solidFill>
-                  <a:prstClr val="black"/>
-                </a:solidFill>
-                <a:latin typeface="Arial" panose="020B0604020202020204" pitchFamily="34" charset="0"/>
-                <a:cs typeface="Arial" panose="020B0604020202020204" pitchFamily="34" charset="0"/>
-              </a:rPr>
-              <a:t> </a:t>
-            </a:r>
-            <a:r>
-              <a:rPr lang="de-DE" sz="1800" dirty="0" err="1">
-                <a:solidFill>
-                  <a:prstClr val="black"/>
-                </a:solidFill>
-                <a:latin typeface="Arial" panose="020B0604020202020204" pitchFamily="34" charset="0"/>
-                <a:cs typeface="Arial" panose="020B0604020202020204" pitchFamily="34" charset="0"/>
-              </a:rPr>
-              <a:t>quis</a:t>
-            </a:r>
-            <a:r>
-              <a:rPr lang="de-DE" sz="1800" dirty="0">
-                <a:solidFill>
-                  <a:prstClr val="black"/>
-                </a:solidFill>
-                <a:latin typeface="Arial" panose="020B0604020202020204" pitchFamily="34" charset="0"/>
-                <a:cs typeface="Arial" panose="020B0604020202020204" pitchFamily="34" charset="0"/>
-              </a:rPr>
-              <a:t> </a:t>
-            </a:r>
-            <a:r>
-              <a:rPr lang="de-DE" sz="1800" dirty="0" err="1">
-                <a:solidFill>
-                  <a:prstClr val="black"/>
-                </a:solidFill>
-                <a:latin typeface="Arial" panose="020B0604020202020204" pitchFamily="34" charset="0"/>
-                <a:cs typeface="Arial" panose="020B0604020202020204" pitchFamily="34" charset="0"/>
-              </a:rPr>
-              <a:t>fermentum</a:t>
-            </a:r>
-            <a:r>
-              <a:rPr lang="de-DE" sz="1800" dirty="0">
-                <a:solidFill>
-                  <a:prstClr val="black"/>
-                </a:solidFill>
-                <a:latin typeface="Arial" panose="020B0604020202020204" pitchFamily="34" charset="0"/>
-                <a:cs typeface="Arial" panose="020B0604020202020204" pitchFamily="34" charset="0"/>
-              </a:rPr>
-              <a:t> </a:t>
-            </a:r>
-            <a:r>
-              <a:rPr lang="de-DE" sz="1800" dirty="0" err="1">
-                <a:solidFill>
-                  <a:prstClr val="black"/>
-                </a:solidFill>
-                <a:latin typeface="Arial" panose="020B0604020202020204" pitchFamily="34" charset="0"/>
-                <a:cs typeface="Arial" panose="020B0604020202020204" pitchFamily="34" charset="0"/>
-              </a:rPr>
-              <a:t>ultricies</a:t>
-            </a:r>
-            <a:r>
-              <a:rPr lang="de-DE" sz="1800" dirty="0">
-                <a:solidFill>
-                  <a:prstClr val="black"/>
-                </a:solidFill>
-                <a:latin typeface="Arial" panose="020B0604020202020204" pitchFamily="34" charset="0"/>
-                <a:cs typeface="Arial" panose="020B0604020202020204" pitchFamily="34" charset="0"/>
-              </a:rPr>
-              <a:t>, </a:t>
-            </a:r>
-            <a:r>
-              <a:rPr lang="de-DE" sz="1800" dirty="0" err="1">
-                <a:solidFill>
-                  <a:prstClr val="black"/>
-                </a:solidFill>
-                <a:latin typeface="Arial" panose="020B0604020202020204" pitchFamily="34" charset="0"/>
-                <a:cs typeface="Arial" panose="020B0604020202020204" pitchFamily="34" charset="0"/>
-              </a:rPr>
-              <a:t>dolor</a:t>
-            </a:r>
-            <a:r>
-              <a:rPr lang="de-DE" sz="1800" dirty="0">
-                <a:solidFill>
-                  <a:prstClr val="black"/>
-                </a:solidFill>
-                <a:latin typeface="Arial" panose="020B0604020202020204" pitchFamily="34" charset="0"/>
-                <a:cs typeface="Arial" panose="020B0604020202020204" pitchFamily="34" charset="0"/>
-              </a:rPr>
-              <a:t> ante </a:t>
-            </a:r>
-            <a:r>
-              <a:rPr lang="de-DE" sz="1800" dirty="0" err="1">
-                <a:solidFill>
-                  <a:prstClr val="black"/>
-                </a:solidFill>
-                <a:latin typeface="Arial" panose="020B0604020202020204" pitchFamily="34" charset="0"/>
-                <a:cs typeface="Arial" panose="020B0604020202020204" pitchFamily="34" charset="0"/>
-              </a:rPr>
-              <a:t>convallis</a:t>
-            </a:r>
-            <a:r>
-              <a:rPr lang="de-DE" sz="1800" dirty="0">
-                <a:solidFill>
-                  <a:prstClr val="black"/>
-                </a:solidFill>
-                <a:latin typeface="Arial" panose="020B0604020202020204" pitchFamily="34" charset="0"/>
-                <a:cs typeface="Arial" panose="020B0604020202020204" pitchFamily="34" charset="0"/>
-              </a:rPr>
-              <a:t> </a:t>
-            </a:r>
-            <a:r>
-              <a:rPr lang="de-DE" sz="1800" dirty="0" err="1">
-                <a:solidFill>
-                  <a:prstClr val="black"/>
-                </a:solidFill>
-                <a:latin typeface="Arial" panose="020B0604020202020204" pitchFamily="34" charset="0"/>
-                <a:cs typeface="Arial" panose="020B0604020202020204" pitchFamily="34" charset="0"/>
-              </a:rPr>
-              <a:t>eros</a:t>
-            </a:r>
-            <a:r>
-              <a:rPr lang="de-DE" sz="1800" dirty="0">
-                <a:solidFill>
-                  <a:prstClr val="black"/>
-                </a:solidFill>
-                <a:latin typeface="Arial" panose="020B0604020202020204" pitchFamily="34" charset="0"/>
-                <a:cs typeface="Arial" panose="020B0604020202020204" pitchFamily="34" charset="0"/>
-              </a:rPr>
-              <a:t>, </a:t>
-            </a:r>
-            <a:r>
-              <a:rPr lang="de-DE" sz="1800" dirty="0" err="1">
-                <a:solidFill>
-                  <a:prstClr val="black"/>
-                </a:solidFill>
-                <a:latin typeface="Arial" panose="020B0604020202020204" pitchFamily="34" charset="0"/>
-                <a:cs typeface="Arial" panose="020B0604020202020204" pitchFamily="34" charset="0"/>
-              </a:rPr>
-              <a:t>at</a:t>
-            </a:r>
-            <a:r>
-              <a:rPr lang="de-DE" sz="1800" dirty="0">
-                <a:solidFill>
-                  <a:prstClr val="black"/>
-                </a:solidFill>
-                <a:latin typeface="Arial" panose="020B0604020202020204" pitchFamily="34" charset="0"/>
-                <a:cs typeface="Arial" panose="020B0604020202020204" pitchFamily="34" charset="0"/>
-              </a:rPr>
-              <a:t> </a:t>
-            </a:r>
-            <a:r>
-              <a:rPr lang="de-DE" sz="1800" dirty="0" err="1">
-                <a:solidFill>
-                  <a:prstClr val="black"/>
-                </a:solidFill>
-                <a:latin typeface="Arial" panose="020B0604020202020204" pitchFamily="34" charset="0"/>
-                <a:cs typeface="Arial" panose="020B0604020202020204" pitchFamily="34" charset="0"/>
-              </a:rPr>
-              <a:t>tincidunt</a:t>
-            </a:r>
-            <a:r>
-              <a:rPr lang="de-DE" sz="1800" dirty="0">
-                <a:solidFill>
-                  <a:prstClr val="black"/>
-                </a:solidFill>
-                <a:latin typeface="Arial" panose="020B0604020202020204" pitchFamily="34" charset="0"/>
-                <a:cs typeface="Arial" panose="020B0604020202020204" pitchFamily="34" charset="0"/>
-              </a:rPr>
-              <a:t> </a:t>
-            </a:r>
-            <a:r>
-              <a:rPr lang="de-DE" sz="1800" dirty="0" err="1">
-                <a:solidFill>
-                  <a:prstClr val="black"/>
-                </a:solidFill>
-                <a:latin typeface="Arial" panose="020B0604020202020204" pitchFamily="34" charset="0"/>
-                <a:cs typeface="Arial" panose="020B0604020202020204" pitchFamily="34" charset="0"/>
-              </a:rPr>
-              <a:t>augue</a:t>
-            </a:r>
-            <a:r>
-              <a:rPr lang="de-DE" sz="1800" dirty="0">
-                <a:solidFill>
-                  <a:prstClr val="black"/>
-                </a:solidFill>
-                <a:latin typeface="Arial" panose="020B0604020202020204" pitchFamily="34" charset="0"/>
-                <a:cs typeface="Arial" panose="020B0604020202020204" pitchFamily="34" charset="0"/>
-              </a:rPr>
-              <a:t> </a:t>
-            </a:r>
-            <a:r>
-              <a:rPr lang="de-DE" sz="1800" dirty="0" err="1">
-                <a:solidFill>
-                  <a:prstClr val="black"/>
-                </a:solidFill>
-                <a:latin typeface="Arial" panose="020B0604020202020204" pitchFamily="34" charset="0"/>
-                <a:cs typeface="Arial" panose="020B0604020202020204" pitchFamily="34" charset="0"/>
-              </a:rPr>
-              <a:t>massa</a:t>
-            </a:r>
-            <a:r>
-              <a:rPr lang="de-DE" sz="1800" dirty="0">
-                <a:solidFill>
-                  <a:prstClr val="black"/>
-                </a:solidFill>
-                <a:latin typeface="Arial" panose="020B0604020202020204" pitchFamily="34" charset="0"/>
-                <a:cs typeface="Arial" panose="020B0604020202020204" pitchFamily="34" charset="0"/>
-              </a:rPr>
-              <a:t> </a:t>
-            </a:r>
-            <a:r>
-              <a:rPr lang="de-DE" sz="1800" dirty="0" err="1">
-                <a:solidFill>
-                  <a:prstClr val="black"/>
-                </a:solidFill>
-                <a:latin typeface="Arial" panose="020B0604020202020204" pitchFamily="34" charset="0"/>
-                <a:cs typeface="Arial" panose="020B0604020202020204" pitchFamily="34" charset="0"/>
-              </a:rPr>
-              <a:t>id</a:t>
-            </a:r>
-            <a:r>
-              <a:rPr lang="de-DE" sz="1800" dirty="0">
-                <a:solidFill>
-                  <a:prstClr val="black"/>
-                </a:solidFill>
-                <a:latin typeface="Arial" panose="020B0604020202020204" pitchFamily="34" charset="0"/>
-                <a:cs typeface="Arial" panose="020B0604020202020204" pitchFamily="34" charset="0"/>
-              </a:rPr>
-              <a:t> </a:t>
-            </a:r>
-            <a:r>
-              <a:rPr lang="de-DE" sz="1800" dirty="0" err="1">
-                <a:solidFill>
-                  <a:prstClr val="black"/>
-                </a:solidFill>
-                <a:latin typeface="Arial" panose="020B0604020202020204" pitchFamily="34" charset="0"/>
-                <a:cs typeface="Arial" panose="020B0604020202020204" pitchFamily="34" charset="0"/>
-              </a:rPr>
-              <a:t>dolor</a:t>
-            </a:r>
-            <a:r>
-              <a:rPr lang="de-DE" sz="1800" dirty="0">
-                <a:solidFill>
-                  <a:prstClr val="black"/>
-                </a:solidFill>
-                <a:latin typeface="Arial" panose="020B0604020202020204" pitchFamily="34" charset="0"/>
-                <a:cs typeface="Arial" panose="020B0604020202020204" pitchFamily="34" charset="0"/>
-              </a:rPr>
-              <a:t>. </a:t>
+              <a:t>Architekturkonzept.</a:t>
             </a:r>
             <a:endParaRPr lang="de-DE" sz="1800" dirty="0">
               <a:latin typeface="Arial" panose="020B0604020202020204" pitchFamily="34" charset="0"/>
@@ -8641,8 +7939,8 @@
         </p:nvSpPr>
         <p:spPr>
           <a:xfrm>
-            <a:off x="12084461" y="24956284"/>
-            <a:ext cx="2045694" cy="3416320"/>
+            <a:off x="7374790" y="28512434"/>
+            <a:ext cx="6668433" cy="369332"/>
           </a:xfrm>
           <a:prstGeom prst="rect">
             <a:avLst/>
@@ -8662,307 +7960,7 @@
                 <a:latin typeface="Arial" panose="020B0604020202020204" pitchFamily="34" charset="0"/>
                 <a:cs typeface="Arial" panose="020B0604020202020204" pitchFamily="34" charset="0"/>
               </a:rPr>
-              <a:t>Lorem</a:t>
-            </a:r>
-            <a:r>
-              <a:rPr lang="de-DE" sz="1800" dirty="0">
-                <a:solidFill>
-                  <a:prstClr val="black"/>
-                </a:solidFill>
-                <a:latin typeface="Arial" panose="020B0604020202020204" pitchFamily="34" charset="0"/>
-                <a:cs typeface="Arial" panose="020B0604020202020204" pitchFamily="34" charset="0"/>
-              </a:rPr>
-              <a:t> </a:t>
-            </a:r>
-            <a:r>
-              <a:rPr lang="de-DE" sz="1800" dirty="0" err="1">
-                <a:solidFill>
-                  <a:prstClr val="black"/>
-                </a:solidFill>
-                <a:latin typeface="Arial" panose="020B0604020202020204" pitchFamily="34" charset="0"/>
-                <a:cs typeface="Arial" panose="020B0604020202020204" pitchFamily="34" charset="0"/>
-              </a:rPr>
-              <a:t>psum</a:t>
-            </a:r>
-            <a:r>
-              <a:rPr lang="de-DE" sz="1800" dirty="0">
-                <a:solidFill>
-                  <a:prstClr val="black"/>
-                </a:solidFill>
-                <a:latin typeface="Arial" panose="020B0604020202020204" pitchFamily="34" charset="0"/>
-                <a:cs typeface="Arial" panose="020B0604020202020204" pitchFamily="34" charset="0"/>
-              </a:rPr>
-              <a:t> </a:t>
-            </a:r>
-            <a:r>
-              <a:rPr lang="de-DE" sz="1800" dirty="0" err="1">
-                <a:solidFill>
-                  <a:prstClr val="black"/>
-                </a:solidFill>
-                <a:latin typeface="Arial" panose="020B0604020202020204" pitchFamily="34" charset="0"/>
-                <a:cs typeface="Arial" panose="020B0604020202020204" pitchFamily="34" charset="0"/>
-              </a:rPr>
-              <a:t>dolor</a:t>
-            </a:r>
-            <a:r>
-              <a:rPr lang="de-DE" sz="1800" dirty="0">
-                <a:solidFill>
-                  <a:prstClr val="black"/>
-                </a:solidFill>
-                <a:latin typeface="Arial" panose="020B0604020202020204" pitchFamily="34" charset="0"/>
-                <a:cs typeface="Arial" panose="020B0604020202020204" pitchFamily="34" charset="0"/>
-              </a:rPr>
-              <a:t> </a:t>
-            </a:r>
-            <a:r>
-              <a:rPr lang="de-DE" sz="1800" dirty="0" err="1">
-                <a:solidFill>
-                  <a:prstClr val="black"/>
-                </a:solidFill>
-                <a:latin typeface="Arial" panose="020B0604020202020204" pitchFamily="34" charset="0"/>
-                <a:cs typeface="Arial" panose="020B0604020202020204" pitchFamily="34" charset="0"/>
-              </a:rPr>
-              <a:t>sit</a:t>
-            </a:r>
-            <a:r>
-              <a:rPr lang="de-DE" sz="1800" dirty="0">
-                <a:solidFill>
-                  <a:prstClr val="black"/>
-                </a:solidFill>
-                <a:latin typeface="Arial" panose="020B0604020202020204" pitchFamily="34" charset="0"/>
-                <a:cs typeface="Arial" panose="020B0604020202020204" pitchFamily="34" charset="0"/>
-              </a:rPr>
-              <a:t> </a:t>
-            </a:r>
-            <a:r>
-              <a:rPr lang="de-DE" sz="1800" dirty="0" err="1">
-                <a:solidFill>
-                  <a:prstClr val="black"/>
-                </a:solidFill>
-                <a:latin typeface="Arial" panose="020B0604020202020204" pitchFamily="34" charset="0"/>
-                <a:cs typeface="Arial" panose="020B0604020202020204" pitchFamily="34" charset="0"/>
-              </a:rPr>
-              <a:t>amet</a:t>
-            </a:r>
-            <a:r>
-              <a:rPr lang="de-DE" sz="1800" dirty="0">
-                <a:solidFill>
-                  <a:prstClr val="black"/>
-                </a:solidFill>
-                <a:latin typeface="Arial" panose="020B0604020202020204" pitchFamily="34" charset="0"/>
-                <a:cs typeface="Arial" panose="020B0604020202020204" pitchFamily="34" charset="0"/>
-              </a:rPr>
-              <a:t>, </a:t>
-            </a:r>
-            <a:r>
-              <a:rPr lang="de-DE" sz="1800" dirty="0" err="1">
-                <a:solidFill>
-                  <a:prstClr val="black"/>
-                </a:solidFill>
-                <a:latin typeface="Arial" panose="020B0604020202020204" pitchFamily="34" charset="0"/>
-                <a:cs typeface="Arial" panose="020B0604020202020204" pitchFamily="34" charset="0"/>
-              </a:rPr>
-              <a:t>consectetur</a:t>
-            </a:r>
-            <a:r>
-              <a:rPr lang="de-DE" sz="1800" dirty="0">
-                <a:solidFill>
-                  <a:prstClr val="black"/>
-                </a:solidFill>
-                <a:latin typeface="Arial" panose="020B0604020202020204" pitchFamily="34" charset="0"/>
-                <a:cs typeface="Arial" panose="020B0604020202020204" pitchFamily="34" charset="0"/>
-              </a:rPr>
-              <a:t> </a:t>
-            </a:r>
-            <a:r>
-              <a:rPr lang="de-DE" sz="1800" dirty="0" err="1">
-                <a:solidFill>
-                  <a:prstClr val="black"/>
-                </a:solidFill>
-                <a:latin typeface="Arial" panose="020B0604020202020204" pitchFamily="34" charset="0"/>
-                <a:cs typeface="Arial" panose="020B0604020202020204" pitchFamily="34" charset="0"/>
-              </a:rPr>
-              <a:t>adipiscing</a:t>
-            </a:r>
-            <a:r>
-              <a:rPr lang="de-DE" sz="1800" dirty="0">
-                <a:solidFill>
-                  <a:prstClr val="black"/>
-                </a:solidFill>
-                <a:latin typeface="Arial" panose="020B0604020202020204" pitchFamily="34" charset="0"/>
-                <a:cs typeface="Arial" panose="020B0604020202020204" pitchFamily="34" charset="0"/>
-              </a:rPr>
-              <a:t> </a:t>
-            </a:r>
-            <a:r>
-              <a:rPr lang="de-DE" sz="1800" dirty="0" err="1">
-                <a:solidFill>
-                  <a:prstClr val="black"/>
-                </a:solidFill>
-                <a:latin typeface="Arial" panose="020B0604020202020204" pitchFamily="34" charset="0"/>
-                <a:cs typeface="Arial" panose="020B0604020202020204" pitchFamily="34" charset="0"/>
-              </a:rPr>
-              <a:t>elit</a:t>
-            </a:r>
-            <a:r>
-              <a:rPr lang="de-DE" sz="1800" dirty="0">
-                <a:solidFill>
-                  <a:prstClr val="black"/>
-                </a:solidFill>
-                <a:latin typeface="Arial" panose="020B0604020202020204" pitchFamily="34" charset="0"/>
-                <a:cs typeface="Arial" panose="020B0604020202020204" pitchFamily="34" charset="0"/>
-              </a:rPr>
-              <a:t>. Nam </a:t>
-            </a:r>
-            <a:r>
-              <a:rPr lang="de-DE" sz="1800" dirty="0" err="1">
-                <a:solidFill>
-                  <a:prstClr val="black"/>
-                </a:solidFill>
-                <a:latin typeface="Arial" panose="020B0604020202020204" pitchFamily="34" charset="0"/>
-                <a:cs typeface="Arial" panose="020B0604020202020204" pitchFamily="34" charset="0"/>
-              </a:rPr>
-              <a:t>sodales</a:t>
-            </a:r>
-            <a:r>
-              <a:rPr lang="de-DE" sz="1800" dirty="0">
-                <a:solidFill>
-                  <a:prstClr val="black"/>
-                </a:solidFill>
-                <a:latin typeface="Arial" panose="020B0604020202020204" pitchFamily="34" charset="0"/>
-                <a:cs typeface="Arial" panose="020B0604020202020204" pitchFamily="34" charset="0"/>
-              </a:rPr>
-              <a:t> </a:t>
-            </a:r>
-            <a:r>
-              <a:rPr lang="de-DE" sz="1800" dirty="0" err="1">
-                <a:solidFill>
-                  <a:prstClr val="black"/>
-                </a:solidFill>
-                <a:latin typeface="Arial" panose="020B0604020202020204" pitchFamily="34" charset="0"/>
-                <a:cs typeface="Arial" panose="020B0604020202020204" pitchFamily="34" charset="0"/>
-              </a:rPr>
-              <a:t>dignissim</a:t>
-            </a:r>
-            <a:r>
-              <a:rPr lang="de-DE" sz="1800" dirty="0">
-                <a:solidFill>
-                  <a:prstClr val="black"/>
-                </a:solidFill>
-                <a:latin typeface="Arial" panose="020B0604020202020204" pitchFamily="34" charset="0"/>
-                <a:cs typeface="Arial" panose="020B0604020202020204" pitchFamily="34" charset="0"/>
-              </a:rPr>
-              <a:t> </a:t>
-            </a:r>
-            <a:r>
-              <a:rPr lang="de-DE" sz="1800" dirty="0" err="1">
-                <a:solidFill>
-                  <a:prstClr val="black"/>
-                </a:solidFill>
-                <a:latin typeface="Arial" panose="020B0604020202020204" pitchFamily="34" charset="0"/>
-                <a:cs typeface="Arial" panose="020B0604020202020204" pitchFamily="34" charset="0"/>
-              </a:rPr>
-              <a:t>eros</a:t>
-            </a:r>
-            <a:r>
-              <a:rPr lang="de-DE" sz="1800" dirty="0">
-                <a:solidFill>
-                  <a:prstClr val="black"/>
-                </a:solidFill>
-                <a:latin typeface="Arial" panose="020B0604020202020204" pitchFamily="34" charset="0"/>
-                <a:cs typeface="Arial" panose="020B0604020202020204" pitchFamily="34" charset="0"/>
-              </a:rPr>
-              <a:t>, </a:t>
-            </a:r>
-            <a:r>
-              <a:rPr lang="de-DE" sz="1800" dirty="0" err="1">
-                <a:solidFill>
-                  <a:prstClr val="black"/>
-                </a:solidFill>
-                <a:latin typeface="Arial" panose="020B0604020202020204" pitchFamily="34" charset="0"/>
-                <a:cs typeface="Arial" panose="020B0604020202020204" pitchFamily="34" charset="0"/>
-              </a:rPr>
-              <a:t>rutrum</a:t>
-            </a:r>
-            <a:r>
-              <a:rPr lang="de-DE" sz="1800" dirty="0">
-                <a:solidFill>
-                  <a:prstClr val="black"/>
-                </a:solidFill>
-                <a:latin typeface="Arial" panose="020B0604020202020204" pitchFamily="34" charset="0"/>
-                <a:cs typeface="Arial" panose="020B0604020202020204" pitchFamily="34" charset="0"/>
-              </a:rPr>
-              <a:t> </a:t>
-            </a:r>
-            <a:r>
-              <a:rPr lang="de-DE" sz="1800" dirty="0" err="1">
-                <a:solidFill>
-                  <a:prstClr val="black"/>
-                </a:solidFill>
-                <a:latin typeface="Arial" panose="020B0604020202020204" pitchFamily="34" charset="0"/>
-                <a:cs typeface="Arial" panose="020B0604020202020204" pitchFamily="34" charset="0"/>
-              </a:rPr>
-              <a:t>gravida</a:t>
-            </a:r>
-            <a:r>
-              <a:rPr lang="de-DE" sz="1800" dirty="0">
-                <a:solidFill>
-                  <a:prstClr val="black"/>
-                </a:solidFill>
-                <a:latin typeface="Arial" panose="020B0604020202020204" pitchFamily="34" charset="0"/>
-                <a:cs typeface="Arial" panose="020B0604020202020204" pitchFamily="34" charset="0"/>
-              </a:rPr>
-              <a:t> </a:t>
-            </a:r>
-            <a:r>
-              <a:rPr lang="de-DE" sz="1800" dirty="0" err="1">
-                <a:solidFill>
-                  <a:prstClr val="black"/>
-                </a:solidFill>
-                <a:latin typeface="Arial" panose="020B0604020202020204" pitchFamily="34" charset="0"/>
-                <a:cs typeface="Arial" panose="020B0604020202020204" pitchFamily="34" charset="0"/>
-              </a:rPr>
-              <a:t>ipsum</a:t>
-            </a:r>
-            <a:r>
-              <a:rPr lang="de-DE" sz="1800" dirty="0">
-                <a:solidFill>
-                  <a:prstClr val="black"/>
-                </a:solidFill>
-                <a:latin typeface="Arial" panose="020B0604020202020204" pitchFamily="34" charset="0"/>
-                <a:cs typeface="Arial" panose="020B0604020202020204" pitchFamily="34" charset="0"/>
-              </a:rPr>
-              <a:t> </a:t>
-            </a:r>
-            <a:r>
-              <a:rPr lang="de-DE" sz="1800" dirty="0" err="1">
-                <a:solidFill>
-                  <a:prstClr val="black"/>
-                </a:solidFill>
-                <a:latin typeface="Arial" panose="020B0604020202020204" pitchFamily="34" charset="0"/>
-                <a:cs typeface="Arial" panose="020B0604020202020204" pitchFamily="34" charset="0"/>
-              </a:rPr>
-              <a:t>blandit</a:t>
-            </a:r>
-            <a:r>
-              <a:rPr lang="de-DE" sz="1800" dirty="0">
-                <a:solidFill>
-                  <a:prstClr val="black"/>
-                </a:solidFill>
-                <a:latin typeface="Arial" panose="020B0604020202020204" pitchFamily="34" charset="0"/>
-                <a:cs typeface="Arial" panose="020B0604020202020204" pitchFamily="34" charset="0"/>
-              </a:rPr>
-              <a:t> </a:t>
-            </a:r>
-            <a:r>
-              <a:rPr lang="de-DE" sz="1800" dirty="0" err="1">
-                <a:solidFill>
-                  <a:prstClr val="black"/>
-                </a:solidFill>
-                <a:latin typeface="Arial" panose="020B0604020202020204" pitchFamily="34" charset="0"/>
-                <a:cs typeface="Arial" panose="020B0604020202020204" pitchFamily="34" charset="0"/>
-              </a:rPr>
-              <a:t>vitae</a:t>
+              <a:t>Ebenenstruktur</a:t>
             </a:r>
             <a:r>
               <a:rPr lang="de-DE" sz="1800" dirty="0">
@@ -8974,116 +7972,6 @@
               </a:rPr>
               <a:t>. </a:t>
             </a:r>
-            <a:r>
-              <a:rPr lang="de-DE" sz="1800" dirty="0" err="1">
-                <a:solidFill>
-                  <a:prstClr val="black"/>
-                </a:solidFill>
-                <a:latin typeface="Arial" panose="020B0604020202020204" pitchFamily="34" charset="0"/>
-                <a:cs typeface="Arial" panose="020B0604020202020204" pitchFamily="34" charset="0"/>
-              </a:rPr>
-              <a:t>Quisque</a:t>
-            </a:r>
-            <a:r>
-              <a:rPr lang="de-DE" sz="1800" dirty="0">
-                <a:solidFill>
-                  <a:prstClr val="black"/>
-                </a:solidFill>
-                <a:latin typeface="Arial" panose="020B0604020202020204" pitchFamily="34" charset="0"/>
-                <a:cs typeface="Arial" panose="020B0604020202020204" pitchFamily="34" charset="0"/>
-              </a:rPr>
-              <a:t> </a:t>
-            </a:r>
-            <a:r>
-              <a:rPr lang="de-DE" sz="1800" dirty="0" err="1">
-                <a:solidFill>
-                  <a:prstClr val="black"/>
-                </a:solidFill>
-                <a:latin typeface="Arial" panose="020B0604020202020204" pitchFamily="34" charset="0"/>
-                <a:cs typeface="Arial" panose="020B0604020202020204" pitchFamily="34" charset="0"/>
-              </a:rPr>
-              <a:t>adipiscing</a:t>
-            </a:r>
-            <a:r>
-              <a:rPr lang="de-DE" sz="1800" dirty="0">
-                <a:solidFill>
-                  <a:prstClr val="black"/>
-                </a:solidFill>
-                <a:latin typeface="Arial" panose="020B0604020202020204" pitchFamily="34" charset="0"/>
-                <a:cs typeface="Arial" panose="020B0604020202020204" pitchFamily="34" charset="0"/>
-              </a:rPr>
-              <a:t>, </a:t>
-            </a:r>
-            <a:r>
-              <a:rPr lang="de-DE" sz="1800" dirty="0" err="1">
-                <a:solidFill>
-                  <a:prstClr val="black"/>
-                </a:solidFill>
-                <a:latin typeface="Arial" panose="020B0604020202020204" pitchFamily="34" charset="0"/>
-                <a:cs typeface="Arial" panose="020B0604020202020204" pitchFamily="34" charset="0"/>
-              </a:rPr>
-              <a:t>dui</a:t>
-            </a:r>
-            <a:r>
-              <a:rPr lang="de-DE" sz="1800" dirty="0">
-                <a:solidFill>
-                  <a:prstClr val="black"/>
-                </a:solidFill>
-                <a:latin typeface="Arial" panose="020B0604020202020204" pitchFamily="34" charset="0"/>
-                <a:cs typeface="Arial" panose="020B0604020202020204" pitchFamily="34" charset="0"/>
-              </a:rPr>
-              <a:t> </a:t>
-            </a:r>
-            <a:r>
-              <a:rPr lang="de-DE" sz="1800" dirty="0" err="1">
-                <a:solidFill>
-                  <a:prstClr val="black"/>
-                </a:solidFill>
-                <a:latin typeface="Arial" panose="020B0604020202020204" pitchFamily="34" charset="0"/>
-                <a:cs typeface="Arial" panose="020B0604020202020204" pitchFamily="34" charset="0"/>
-              </a:rPr>
-              <a:t>quis</a:t>
-            </a:r>
-            <a:r>
-              <a:rPr lang="de-DE" sz="1800" dirty="0">
-                <a:solidFill>
-                  <a:prstClr val="black"/>
-                </a:solidFill>
-                <a:latin typeface="Arial" panose="020B0604020202020204" pitchFamily="34" charset="0"/>
-                <a:cs typeface="Arial" panose="020B0604020202020204" pitchFamily="34" charset="0"/>
-              </a:rPr>
-              <a:t> </a:t>
-            </a:r>
-            <a:r>
-              <a:rPr lang="de-DE" sz="1800" dirty="0" err="1">
-                <a:solidFill>
-                  <a:prstClr val="black"/>
-                </a:solidFill>
-                <a:latin typeface="Arial" panose="020B0604020202020204" pitchFamily="34" charset="0"/>
-                <a:cs typeface="Arial" panose="020B0604020202020204" pitchFamily="34" charset="0"/>
-              </a:rPr>
-              <a:t>fermentum</a:t>
-            </a:r>
-            <a:r>
-              <a:rPr lang="de-DE" sz="1800" dirty="0">
-                <a:solidFill>
-                  <a:prstClr val="black"/>
-                </a:solidFill>
-                <a:latin typeface="Arial" panose="020B0604020202020204" pitchFamily="34" charset="0"/>
-                <a:cs typeface="Arial" panose="020B0604020202020204" pitchFamily="34" charset="0"/>
-              </a:rPr>
-              <a:t> </a:t>
-            </a:r>
-            <a:r>
-              <a:rPr lang="de-DE" sz="1800" dirty="0" err="1">
-                <a:solidFill>
-                  <a:prstClr val="black"/>
-                </a:solidFill>
-                <a:latin typeface="Arial" panose="020B0604020202020204" pitchFamily="34" charset="0"/>
-                <a:cs typeface="Arial" panose="020B0604020202020204" pitchFamily="34" charset="0"/>
-              </a:rPr>
-              <a:t>ultricie</a:t>
-            </a:r>
             <a:endParaRPr lang="de-DE" sz="1800" dirty="0">
               <a:latin typeface="Arial" panose="020B0604020202020204" pitchFamily="34" charset="0"/>
               <a:cs typeface="Arial" panose="020B0604020202020204" pitchFamily="34" charset="0"/>
@@ -9099,8 +7987,8 @@
         </p:nvSpPr>
         <p:spPr>
           <a:xfrm>
-            <a:off x="14525047" y="23938386"/>
-            <a:ext cx="6407027" cy="923330"/>
+            <a:off x="14409842" y="24415302"/>
+            <a:ext cx="6407027" cy="369332"/>
           </a:xfrm>
           <a:prstGeom prst="rect">
             <a:avLst/>
@@ -9113,16 +8001,6 @@
           <a:lstStyle/>
           <a:p>
             <a:r>
-              <a:rPr lang="de-DE" sz="1800" dirty="0" err="1">
-                <a:solidFill>
-                  <a:prstClr val="black"/>
-                </a:solidFill>
-                <a:latin typeface="Arial" panose="020B0604020202020204" pitchFamily="34" charset="0"/>
-                <a:cs typeface="Arial" panose="020B0604020202020204" pitchFamily="34" charset="0"/>
-              </a:rPr>
-              <a:t>Lorem</a:t>
-            </a:r>
-            <a:r>
               <a:rPr lang="de-DE" sz="1800" dirty="0">
                 <a:solidFill>
                   <a:prstClr val="black"/>
@@ -9130,427 +8008,7 @@
                 <a:latin typeface="Arial" panose="020B0604020202020204" pitchFamily="34" charset="0"/>
                 <a:cs typeface="Arial" panose="020B0604020202020204" pitchFamily="34" charset="0"/>
               </a:rPr>
-              <a:t> </a:t>
-            </a:r>
-            <a:r>
-              <a:rPr lang="de-DE" sz="1800" dirty="0" err="1">
-                <a:solidFill>
-                  <a:prstClr val="black"/>
-                </a:solidFill>
-                <a:latin typeface="Arial" panose="020B0604020202020204" pitchFamily="34" charset="0"/>
-                <a:cs typeface="Arial" panose="020B0604020202020204" pitchFamily="34" charset="0"/>
-              </a:rPr>
-              <a:t>ipsum</a:t>
-            </a:r>
-            <a:r>
-              <a:rPr lang="de-DE" sz="1800" dirty="0">
-                <a:solidFill>
-                  <a:prstClr val="black"/>
-                </a:solidFill>
-                <a:latin typeface="Arial" panose="020B0604020202020204" pitchFamily="34" charset="0"/>
-                <a:cs typeface="Arial" panose="020B0604020202020204" pitchFamily="34" charset="0"/>
-              </a:rPr>
-              <a:t> </a:t>
-            </a:r>
-            <a:r>
-              <a:rPr lang="de-DE" sz="1800" dirty="0" err="1">
-                <a:solidFill>
-                  <a:prstClr val="black"/>
-                </a:solidFill>
-                <a:latin typeface="Arial" panose="020B0604020202020204" pitchFamily="34" charset="0"/>
-                <a:cs typeface="Arial" panose="020B0604020202020204" pitchFamily="34" charset="0"/>
-              </a:rPr>
-              <a:t>dolor</a:t>
-            </a:r>
-            <a:r>
-              <a:rPr lang="de-DE" sz="1800" dirty="0">
-                <a:solidFill>
-                  <a:prstClr val="black"/>
-                </a:solidFill>
-                <a:latin typeface="Arial" panose="020B0604020202020204" pitchFamily="34" charset="0"/>
-                <a:cs typeface="Arial" panose="020B0604020202020204" pitchFamily="34" charset="0"/>
-              </a:rPr>
-              <a:t> </a:t>
-            </a:r>
-            <a:r>
-              <a:rPr lang="de-DE" sz="1800" dirty="0" err="1">
-                <a:solidFill>
-                  <a:prstClr val="black"/>
-                </a:solidFill>
-                <a:latin typeface="Arial" panose="020B0604020202020204" pitchFamily="34" charset="0"/>
-                <a:cs typeface="Arial" panose="020B0604020202020204" pitchFamily="34" charset="0"/>
-              </a:rPr>
-              <a:t>sit</a:t>
-            </a:r>
-            <a:r>
-              <a:rPr lang="de-DE" sz="1800" dirty="0">
-                <a:solidFill>
-                  <a:prstClr val="black"/>
-                </a:solidFill>
-                <a:latin typeface="Arial" panose="020B0604020202020204" pitchFamily="34" charset="0"/>
-                <a:cs typeface="Arial" panose="020B0604020202020204" pitchFamily="34" charset="0"/>
-              </a:rPr>
-              <a:t> </a:t>
-            </a:r>
-            <a:r>
-              <a:rPr lang="de-DE" sz="1800" dirty="0" err="1">
-                <a:solidFill>
-                  <a:prstClr val="black"/>
-                </a:solidFill>
-                <a:latin typeface="Arial" panose="020B0604020202020204" pitchFamily="34" charset="0"/>
-                <a:cs typeface="Arial" panose="020B0604020202020204" pitchFamily="34" charset="0"/>
-              </a:rPr>
-              <a:t>amet</a:t>
-            </a:r>
-            <a:r>
-              <a:rPr lang="de-DE" sz="1800" dirty="0">
-                <a:solidFill>
-                  <a:prstClr val="black"/>
-                </a:solidFill>
-                <a:latin typeface="Arial" panose="020B0604020202020204" pitchFamily="34" charset="0"/>
-                <a:cs typeface="Arial" panose="020B0604020202020204" pitchFamily="34" charset="0"/>
-              </a:rPr>
-              <a:t>, </a:t>
-            </a:r>
-            <a:r>
-              <a:rPr lang="de-DE" sz="1800" dirty="0" err="1">
-                <a:solidFill>
-                  <a:prstClr val="black"/>
-                </a:solidFill>
-                <a:latin typeface="Arial" panose="020B0604020202020204" pitchFamily="34" charset="0"/>
-                <a:cs typeface="Arial" panose="020B0604020202020204" pitchFamily="34" charset="0"/>
-              </a:rPr>
-              <a:t>consectetur</a:t>
-            </a:r>
-            <a:r>
-              <a:rPr lang="de-DE" sz="1800" dirty="0">
-                <a:solidFill>
-                  <a:prstClr val="black"/>
-                </a:solidFill>
-                <a:latin typeface="Arial" panose="020B0604020202020204" pitchFamily="34" charset="0"/>
-                <a:cs typeface="Arial" panose="020B0604020202020204" pitchFamily="34" charset="0"/>
-              </a:rPr>
-              <a:t> </a:t>
-            </a:r>
-            <a:r>
-              <a:rPr lang="de-DE" sz="1800" dirty="0" err="1">
-                <a:solidFill>
-                  <a:prstClr val="black"/>
-                </a:solidFill>
-                <a:latin typeface="Arial" panose="020B0604020202020204" pitchFamily="34" charset="0"/>
-                <a:cs typeface="Arial" panose="020B0604020202020204" pitchFamily="34" charset="0"/>
-              </a:rPr>
-              <a:t>adipiscing</a:t>
-            </a:r>
-            <a:r>
-              <a:rPr lang="de-DE" sz="1800" dirty="0">
-                <a:solidFill>
-                  <a:prstClr val="black"/>
-                </a:solidFill>
-                <a:latin typeface="Arial" panose="020B0604020202020204" pitchFamily="34" charset="0"/>
-                <a:cs typeface="Arial" panose="020B0604020202020204" pitchFamily="34" charset="0"/>
-              </a:rPr>
-              <a:t> </a:t>
-            </a:r>
-            <a:r>
-              <a:rPr lang="de-DE" sz="1800" dirty="0" err="1">
-                <a:solidFill>
-                  <a:prstClr val="black"/>
-                </a:solidFill>
-                <a:latin typeface="Arial" panose="020B0604020202020204" pitchFamily="34" charset="0"/>
-                <a:cs typeface="Arial" panose="020B0604020202020204" pitchFamily="34" charset="0"/>
-              </a:rPr>
-              <a:t>elit</a:t>
-            </a:r>
-            <a:r>
-              <a:rPr lang="de-DE" sz="1800" dirty="0">
-                <a:solidFill>
-                  <a:prstClr val="black"/>
-                </a:solidFill>
-                <a:latin typeface="Arial" panose="020B0604020202020204" pitchFamily="34" charset="0"/>
-                <a:cs typeface="Arial" panose="020B0604020202020204" pitchFamily="34" charset="0"/>
-              </a:rPr>
-              <a:t>. Nam </a:t>
-            </a:r>
-            <a:r>
-              <a:rPr lang="de-DE" sz="1800" dirty="0" err="1">
-                <a:solidFill>
-                  <a:prstClr val="black"/>
-                </a:solidFill>
-                <a:latin typeface="Arial" panose="020B0604020202020204" pitchFamily="34" charset="0"/>
-                <a:cs typeface="Arial" panose="020B0604020202020204" pitchFamily="34" charset="0"/>
-              </a:rPr>
-              <a:t>sodales</a:t>
-            </a:r>
-            <a:r>
-              <a:rPr lang="de-DE" sz="1800" dirty="0">
-                <a:solidFill>
-                  <a:prstClr val="black"/>
-                </a:solidFill>
-                <a:latin typeface="Arial" panose="020B0604020202020204" pitchFamily="34" charset="0"/>
-                <a:cs typeface="Arial" panose="020B0604020202020204" pitchFamily="34" charset="0"/>
-              </a:rPr>
-              <a:t> </a:t>
-            </a:r>
-            <a:r>
-              <a:rPr lang="de-DE" sz="1800" dirty="0" err="1">
-                <a:solidFill>
-                  <a:prstClr val="black"/>
-                </a:solidFill>
-                <a:latin typeface="Arial" panose="020B0604020202020204" pitchFamily="34" charset="0"/>
-                <a:cs typeface="Arial" panose="020B0604020202020204" pitchFamily="34" charset="0"/>
-              </a:rPr>
-              <a:t>dignissim</a:t>
-            </a:r>
-            <a:r>
-              <a:rPr lang="de-DE" sz="1800" dirty="0">
-                <a:solidFill>
-                  <a:prstClr val="black"/>
-                </a:solidFill>
-                <a:latin typeface="Arial" panose="020B0604020202020204" pitchFamily="34" charset="0"/>
-                <a:cs typeface="Arial" panose="020B0604020202020204" pitchFamily="34" charset="0"/>
-              </a:rPr>
-              <a:t> </a:t>
-            </a:r>
-            <a:r>
-              <a:rPr lang="de-DE" sz="1800" dirty="0" err="1">
-                <a:solidFill>
-                  <a:prstClr val="black"/>
-                </a:solidFill>
-                <a:latin typeface="Arial" panose="020B0604020202020204" pitchFamily="34" charset="0"/>
-                <a:cs typeface="Arial" panose="020B0604020202020204" pitchFamily="34" charset="0"/>
-              </a:rPr>
-              <a:t>eros</a:t>
-            </a:r>
-            <a:r>
-              <a:rPr lang="de-DE" sz="1800" dirty="0">
-                <a:solidFill>
-                  <a:prstClr val="black"/>
-                </a:solidFill>
-                <a:latin typeface="Arial" panose="020B0604020202020204" pitchFamily="34" charset="0"/>
-                <a:cs typeface="Arial" panose="020B0604020202020204" pitchFamily="34" charset="0"/>
-              </a:rPr>
-              <a:t>, </a:t>
-            </a:r>
-            <a:r>
-              <a:rPr lang="de-DE" sz="1800" dirty="0" err="1">
-                <a:solidFill>
-                  <a:prstClr val="black"/>
-                </a:solidFill>
-                <a:latin typeface="Arial" panose="020B0604020202020204" pitchFamily="34" charset="0"/>
-                <a:cs typeface="Arial" panose="020B0604020202020204" pitchFamily="34" charset="0"/>
-              </a:rPr>
-              <a:t>rutrum</a:t>
-            </a:r>
-            <a:r>
-              <a:rPr lang="de-DE" sz="1800" dirty="0">
-                <a:solidFill>
-                  <a:prstClr val="black"/>
-                </a:solidFill>
-                <a:latin typeface="Arial" panose="020B0604020202020204" pitchFamily="34" charset="0"/>
-                <a:cs typeface="Arial" panose="020B0604020202020204" pitchFamily="34" charset="0"/>
-              </a:rPr>
-              <a:t> </a:t>
-            </a:r>
-            <a:r>
-              <a:rPr lang="de-DE" sz="1800" dirty="0" err="1">
-                <a:solidFill>
-                  <a:prstClr val="black"/>
-                </a:solidFill>
-                <a:latin typeface="Arial" panose="020B0604020202020204" pitchFamily="34" charset="0"/>
-                <a:cs typeface="Arial" panose="020B0604020202020204" pitchFamily="34" charset="0"/>
-              </a:rPr>
-              <a:t>gravida</a:t>
-            </a:r>
-            <a:r>
-              <a:rPr lang="de-DE" sz="1800" dirty="0">
-                <a:solidFill>
-                  <a:prstClr val="black"/>
-                </a:solidFill>
-                <a:latin typeface="Arial" panose="020B0604020202020204" pitchFamily="34" charset="0"/>
-                <a:cs typeface="Arial" panose="020B0604020202020204" pitchFamily="34" charset="0"/>
-              </a:rPr>
-              <a:t> </a:t>
-            </a:r>
-            <a:r>
-              <a:rPr lang="de-DE" sz="1800" dirty="0" err="1">
-                <a:solidFill>
-                  <a:prstClr val="black"/>
-                </a:solidFill>
-                <a:latin typeface="Arial" panose="020B0604020202020204" pitchFamily="34" charset="0"/>
-                <a:cs typeface="Arial" panose="020B0604020202020204" pitchFamily="34" charset="0"/>
-              </a:rPr>
-              <a:t>ipsum</a:t>
-            </a:r>
-            <a:r>
-              <a:rPr lang="de-DE" sz="1800" dirty="0">
-                <a:solidFill>
-                  <a:prstClr val="black"/>
-                </a:solidFill>
-                <a:latin typeface="Arial" panose="020B0604020202020204" pitchFamily="34" charset="0"/>
-                <a:cs typeface="Arial" panose="020B0604020202020204" pitchFamily="34" charset="0"/>
-              </a:rPr>
-              <a:t> </a:t>
-            </a:r>
-            <a:r>
-              <a:rPr lang="de-DE" sz="1800" dirty="0" err="1">
-                <a:solidFill>
-                  <a:prstClr val="black"/>
-                </a:solidFill>
-                <a:latin typeface="Arial" panose="020B0604020202020204" pitchFamily="34" charset="0"/>
-                <a:cs typeface="Arial" panose="020B0604020202020204" pitchFamily="34" charset="0"/>
-              </a:rPr>
-              <a:t>blandit</a:t>
-            </a:r>
-            <a:r>
-              <a:rPr lang="de-DE" sz="1800" dirty="0">
-                <a:solidFill>
-                  <a:prstClr val="black"/>
-                </a:solidFill>
-                <a:latin typeface="Arial" panose="020B0604020202020204" pitchFamily="34" charset="0"/>
-                <a:cs typeface="Arial" panose="020B0604020202020204" pitchFamily="34" charset="0"/>
-              </a:rPr>
-              <a:t> </a:t>
-            </a:r>
-            <a:r>
-              <a:rPr lang="de-DE" sz="1800" dirty="0" err="1">
-                <a:solidFill>
-                  <a:prstClr val="black"/>
-                </a:solidFill>
-                <a:latin typeface="Arial" panose="020B0604020202020204" pitchFamily="34" charset="0"/>
-                <a:cs typeface="Arial" panose="020B0604020202020204" pitchFamily="34" charset="0"/>
-              </a:rPr>
-              <a:t>vitae</a:t>
-            </a:r>
-            <a:r>
-              <a:rPr lang="de-DE" sz="1800" dirty="0">
-                <a:solidFill>
-                  <a:prstClr val="black"/>
-                </a:solidFill>
-                <a:latin typeface="Arial" panose="020B0604020202020204" pitchFamily="34" charset="0"/>
-                <a:cs typeface="Arial" panose="020B0604020202020204" pitchFamily="34" charset="0"/>
-              </a:rPr>
-              <a:t>. </a:t>
-            </a:r>
-            <a:r>
-              <a:rPr lang="de-DE" sz="1800" dirty="0" err="1">
-                <a:solidFill>
-                  <a:prstClr val="black"/>
-                </a:solidFill>
-                <a:latin typeface="Arial" panose="020B0604020202020204" pitchFamily="34" charset="0"/>
-                <a:cs typeface="Arial" panose="020B0604020202020204" pitchFamily="34" charset="0"/>
-              </a:rPr>
-              <a:t>Quisque</a:t>
-            </a:r>
-            <a:r>
-              <a:rPr lang="de-DE" sz="1800" dirty="0">
-                <a:solidFill>
-                  <a:prstClr val="black"/>
-                </a:solidFill>
-                <a:latin typeface="Arial" panose="020B0604020202020204" pitchFamily="34" charset="0"/>
-                <a:cs typeface="Arial" panose="020B0604020202020204" pitchFamily="34" charset="0"/>
-              </a:rPr>
-              <a:t> </a:t>
-            </a:r>
-            <a:r>
-              <a:rPr lang="de-DE" sz="1800" dirty="0" err="1">
-                <a:solidFill>
-                  <a:prstClr val="black"/>
-                </a:solidFill>
-                <a:latin typeface="Arial" panose="020B0604020202020204" pitchFamily="34" charset="0"/>
-                <a:cs typeface="Arial" panose="020B0604020202020204" pitchFamily="34" charset="0"/>
-              </a:rPr>
-              <a:t>adipiscing</a:t>
-            </a:r>
-            <a:r>
-              <a:rPr lang="de-DE" sz="1800" dirty="0">
-                <a:solidFill>
-                  <a:prstClr val="black"/>
-                </a:solidFill>
-                <a:latin typeface="Arial" panose="020B0604020202020204" pitchFamily="34" charset="0"/>
-                <a:cs typeface="Arial" panose="020B0604020202020204" pitchFamily="34" charset="0"/>
-              </a:rPr>
-              <a:t>, </a:t>
-            </a:r>
-            <a:r>
-              <a:rPr lang="de-DE" sz="1800" dirty="0" err="1">
-                <a:solidFill>
-                  <a:prstClr val="black"/>
-                </a:solidFill>
-                <a:latin typeface="Arial" panose="020B0604020202020204" pitchFamily="34" charset="0"/>
-                <a:cs typeface="Arial" panose="020B0604020202020204" pitchFamily="34" charset="0"/>
-              </a:rPr>
-              <a:t>dui</a:t>
-            </a:r>
-            <a:r>
-              <a:rPr lang="de-DE" sz="1800" dirty="0">
-                <a:solidFill>
-                  <a:prstClr val="black"/>
-                </a:solidFill>
-                <a:latin typeface="Arial" panose="020B0604020202020204" pitchFamily="34" charset="0"/>
-                <a:cs typeface="Arial" panose="020B0604020202020204" pitchFamily="34" charset="0"/>
-              </a:rPr>
-              <a:t> </a:t>
-            </a:r>
-            <a:r>
-              <a:rPr lang="de-DE" sz="1800" dirty="0" err="1">
-                <a:solidFill>
-                  <a:prstClr val="black"/>
-                </a:solidFill>
-                <a:latin typeface="Arial" panose="020B0604020202020204" pitchFamily="34" charset="0"/>
-                <a:cs typeface="Arial" panose="020B0604020202020204" pitchFamily="34" charset="0"/>
-              </a:rPr>
-              <a:t>quis</a:t>
-            </a:r>
-            <a:r>
-              <a:rPr lang="de-DE" sz="1800" dirty="0">
-                <a:solidFill>
-                  <a:prstClr val="black"/>
-                </a:solidFill>
-                <a:latin typeface="Arial" panose="020B0604020202020204" pitchFamily="34" charset="0"/>
-                <a:cs typeface="Arial" panose="020B0604020202020204" pitchFamily="34" charset="0"/>
-              </a:rPr>
-              <a:t> </a:t>
-            </a:r>
-            <a:r>
-              <a:rPr lang="de-DE" sz="1800" dirty="0" err="1">
-                <a:solidFill>
-                  <a:prstClr val="black"/>
-                </a:solidFill>
-                <a:latin typeface="Arial" panose="020B0604020202020204" pitchFamily="34" charset="0"/>
-                <a:cs typeface="Arial" panose="020B0604020202020204" pitchFamily="34" charset="0"/>
-              </a:rPr>
-              <a:t>fermentum</a:t>
-            </a:r>
-            <a:r>
-              <a:rPr lang="de-DE" sz="1800" dirty="0">
-                <a:solidFill>
-                  <a:prstClr val="black"/>
-                </a:solidFill>
-                <a:latin typeface="Arial" panose="020B0604020202020204" pitchFamily="34" charset="0"/>
-                <a:cs typeface="Arial" panose="020B0604020202020204" pitchFamily="34" charset="0"/>
-              </a:rPr>
-              <a:t> </a:t>
-            </a:r>
-            <a:r>
-              <a:rPr lang="de-DE" sz="1800" dirty="0" err="1">
-                <a:solidFill>
-                  <a:prstClr val="black"/>
-                </a:solidFill>
-                <a:latin typeface="Arial" panose="020B0604020202020204" pitchFamily="34" charset="0"/>
-                <a:cs typeface="Arial" panose="020B0604020202020204" pitchFamily="34" charset="0"/>
-              </a:rPr>
-              <a:t>ultricies</a:t>
-            </a:r>
-            <a:r>
-              <a:rPr lang="de-DE" sz="1800" dirty="0">
-                <a:solidFill>
-                  <a:prstClr val="black"/>
-                </a:solidFill>
-                <a:latin typeface="Arial" panose="020B0604020202020204" pitchFamily="34" charset="0"/>
-                <a:cs typeface="Arial" panose="020B0604020202020204" pitchFamily="34" charset="0"/>
-              </a:rPr>
-              <a:t>, </a:t>
+              <a:t>Klassendiagramm.</a:t>
             </a:r>
             <a:endParaRPr lang="de-DE" sz="1800" dirty="0">
               <a:latin typeface="Arial" panose="020B0604020202020204" pitchFamily="34" charset="0"/>
@@ -9567,8 +8025,8 @@
         </p:nvSpPr>
         <p:spPr>
           <a:xfrm>
-            <a:off x="19218877" y="24937824"/>
-            <a:ext cx="1812010" cy="3693319"/>
+            <a:off x="14410553" y="24873527"/>
+            <a:ext cx="6449278" cy="523220"/>
           </a:xfrm>
           <a:prstGeom prst="rect">
             <a:avLst/>
@@ -9581,466 +8039,16 @@
           <a:lstStyle/>
           <a:p>
             <a:r>
-              <a:rPr lang="de-DE" sz="1800" dirty="0" err="1">
+              <a:rPr lang="de-DE" sz="2800" b="1" dirty="0">
                 <a:solidFill>
                   <a:prstClr val="black"/>
                 </a:solidFill>
                 <a:latin typeface="Arial" panose="020B0604020202020204" pitchFamily="34" charset="0"/>
                 <a:cs typeface="Arial" panose="020B0604020202020204" pitchFamily="34" charset="0"/>
               </a:rPr>
-              <a:t>Lorem</a:t>
-            </a:r>
-            <a:r>
-              <a:rPr lang="de-DE" sz="1800" dirty="0">
-                <a:solidFill>
-                  <a:prstClr val="black"/>
-                </a:solidFill>
-                <a:latin typeface="Arial" panose="020B0604020202020204" pitchFamily="34" charset="0"/>
-                <a:cs typeface="Arial" panose="020B0604020202020204" pitchFamily="34" charset="0"/>
-              </a:rPr>
-              <a:t> </a:t>
-            </a:r>
-            <a:r>
-              <a:rPr lang="de-DE" sz="1800" dirty="0" err="1">
-                <a:solidFill>
-                  <a:prstClr val="black"/>
-                </a:solidFill>
-                <a:latin typeface="Arial" panose="020B0604020202020204" pitchFamily="34" charset="0"/>
-                <a:cs typeface="Arial" panose="020B0604020202020204" pitchFamily="34" charset="0"/>
-              </a:rPr>
-              <a:t>ipsum</a:t>
-            </a:r>
-            <a:r>
-              <a:rPr lang="de-DE" sz="1800" dirty="0">
-                <a:solidFill>
-                  <a:prstClr val="black"/>
-                </a:solidFill>
-                <a:latin typeface="Arial" panose="020B0604020202020204" pitchFamily="34" charset="0"/>
-                <a:cs typeface="Arial" panose="020B0604020202020204" pitchFamily="34" charset="0"/>
-              </a:rPr>
-              <a:t> </a:t>
-            </a:r>
-            <a:r>
-              <a:rPr lang="de-DE" sz="1800" dirty="0" err="1">
-                <a:solidFill>
-                  <a:prstClr val="black"/>
-                </a:solidFill>
-                <a:latin typeface="Arial" panose="020B0604020202020204" pitchFamily="34" charset="0"/>
-                <a:cs typeface="Arial" panose="020B0604020202020204" pitchFamily="34" charset="0"/>
-              </a:rPr>
-              <a:t>dolor</a:t>
-            </a:r>
-            <a:r>
-              <a:rPr lang="de-DE" sz="1800" dirty="0">
-                <a:solidFill>
-                  <a:prstClr val="black"/>
-                </a:solidFill>
-                <a:latin typeface="Arial" panose="020B0604020202020204" pitchFamily="34" charset="0"/>
-                <a:cs typeface="Arial" panose="020B0604020202020204" pitchFamily="34" charset="0"/>
-              </a:rPr>
-              <a:t> </a:t>
-            </a:r>
-            <a:r>
-              <a:rPr lang="de-DE" sz="1800" dirty="0" err="1">
-                <a:solidFill>
-                  <a:prstClr val="black"/>
-                </a:solidFill>
-                <a:latin typeface="Arial" panose="020B0604020202020204" pitchFamily="34" charset="0"/>
-                <a:cs typeface="Arial" panose="020B0604020202020204" pitchFamily="34" charset="0"/>
-              </a:rPr>
-              <a:t>sit</a:t>
-            </a:r>
-            <a:r>
-              <a:rPr lang="de-DE" sz="1800" dirty="0">
-                <a:solidFill>
-                  <a:prstClr val="black"/>
-                </a:solidFill>
-                <a:latin typeface="Arial" panose="020B0604020202020204" pitchFamily="34" charset="0"/>
-                <a:cs typeface="Arial" panose="020B0604020202020204" pitchFamily="34" charset="0"/>
-              </a:rPr>
-              <a:t> </a:t>
-            </a:r>
-            <a:r>
-              <a:rPr lang="de-DE" sz="1800" dirty="0" err="1">
-                <a:solidFill>
-                  <a:prstClr val="black"/>
-                </a:solidFill>
-                <a:latin typeface="Arial" panose="020B0604020202020204" pitchFamily="34" charset="0"/>
-                <a:cs typeface="Arial" panose="020B0604020202020204" pitchFamily="34" charset="0"/>
-              </a:rPr>
-              <a:t>amet</a:t>
-            </a:r>
-            <a:r>
-              <a:rPr lang="de-DE" sz="1800" dirty="0">
-                <a:solidFill>
-                  <a:prstClr val="black"/>
-                </a:solidFill>
-                <a:latin typeface="Arial" panose="020B0604020202020204" pitchFamily="34" charset="0"/>
-                <a:cs typeface="Arial" panose="020B0604020202020204" pitchFamily="34" charset="0"/>
-              </a:rPr>
-              <a:t>, </a:t>
-            </a:r>
-            <a:r>
-              <a:rPr lang="de-DE" sz="1800" dirty="0" err="1">
-                <a:solidFill>
-                  <a:prstClr val="black"/>
-                </a:solidFill>
-                <a:latin typeface="Arial" panose="020B0604020202020204" pitchFamily="34" charset="0"/>
-                <a:cs typeface="Arial" panose="020B0604020202020204" pitchFamily="34" charset="0"/>
-              </a:rPr>
-              <a:t>consectetur</a:t>
-            </a:r>
-            <a:r>
-              <a:rPr lang="de-DE" sz="1800" dirty="0">
-                <a:solidFill>
-                  <a:prstClr val="black"/>
-                </a:solidFill>
-                <a:latin typeface="Arial" panose="020B0604020202020204" pitchFamily="34" charset="0"/>
-                <a:cs typeface="Arial" panose="020B0604020202020204" pitchFamily="34" charset="0"/>
-              </a:rPr>
-              <a:t> </a:t>
-            </a:r>
-            <a:r>
-              <a:rPr lang="de-DE" sz="1800" dirty="0" err="1">
-                <a:solidFill>
-                  <a:prstClr val="black"/>
-                </a:solidFill>
-                <a:latin typeface="Arial" panose="020B0604020202020204" pitchFamily="34" charset="0"/>
-                <a:cs typeface="Arial" panose="020B0604020202020204" pitchFamily="34" charset="0"/>
-              </a:rPr>
-              <a:t>adipiscing</a:t>
-            </a:r>
-            <a:r>
-              <a:rPr lang="de-DE" sz="1800" dirty="0">
-                <a:solidFill>
-                  <a:prstClr val="black"/>
-                </a:solidFill>
-                <a:latin typeface="Arial" panose="020B0604020202020204" pitchFamily="34" charset="0"/>
-                <a:cs typeface="Arial" panose="020B0604020202020204" pitchFamily="34" charset="0"/>
-              </a:rPr>
-              <a:t> </a:t>
-            </a:r>
-            <a:r>
-              <a:rPr lang="de-DE" sz="1800" dirty="0" err="1">
-                <a:solidFill>
-                  <a:prstClr val="black"/>
-                </a:solidFill>
-                <a:latin typeface="Arial" panose="020B0604020202020204" pitchFamily="34" charset="0"/>
-                <a:cs typeface="Arial" panose="020B0604020202020204" pitchFamily="34" charset="0"/>
-              </a:rPr>
-              <a:t>elit</a:t>
-            </a:r>
-            <a:r>
-              <a:rPr lang="de-DE" sz="1800" dirty="0">
-                <a:solidFill>
-                  <a:prstClr val="black"/>
-                </a:solidFill>
-                <a:latin typeface="Arial" panose="020B0604020202020204" pitchFamily="34" charset="0"/>
-                <a:cs typeface="Arial" panose="020B0604020202020204" pitchFamily="34" charset="0"/>
-              </a:rPr>
-              <a:t>. Nam </a:t>
-            </a:r>
-            <a:r>
-              <a:rPr lang="de-DE" sz="1800" dirty="0" err="1">
-                <a:solidFill>
-                  <a:prstClr val="black"/>
-                </a:solidFill>
-                <a:latin typeface="Arial" panose="020B0604020202020204" pitchFamily="34" charset="0"/>
-                <a:cs typeface="Arial" panose="020B0604020202020204" pitchFamily="34" charset="0"/>
-              </a:rPr>
-              <a:t>sodales</a:t>
-            </a:r>
-            <a:r>
-              <a:rPr lang="de-DE" sz="1800" dirty="0">
-                <a:solidFill>
-                  <a:prstClr val="black"/>
-                </a:solidFill>
-                <a:latin typeface="Arial" panose="020B0604020202020204" pitchFamily="34" charset="0"/>
-                <a:cs typeface="Arial" panose="020B0604020202020204" pitchFamily="34" charset="0"/>
-              </a:rPr>
-              <a:t> </a:t>
-            </a:r>
-            <a:r>
-              <a:rPr lang="de-DE" sz="1800" dirty="0" err="1">
-                <a:solidFill>
-                  <a:prstClr val="black"/>
-                </a:solidFill>
-                <a:latin typeface="Arial" panose="020B0604020202020204" pitchFamily="34" charset="0"/>
-                <a:cs typeface="Arial" panose="020B0604020202020204" pitchFamily="34" charset="0"/>
-              </a:rPr>
-              <a:t>dignissim</a:t>
-            </a:r>
-            <a:r>
-              <a:rPr lang="de-DE" sz="1800" dirty="0">
-                <a:solidFill>
-                  <a:prstClr val="black"/>
-                </a:solidFill>
-                <a:latin typeface="Arial" panose="020B0604020202020204" pitchFamily="34" charset="0"/>
-                <a:cs typeface="Arial" panose="020B0604020202020204" pitchFamily="34" charset="0"/>
-              </a:rPr>
-              <a:t> </a:t>
-            </a:r>
-            <a:r>
-              <a:rPr lang="de-DE" sz="1800" dirty="0" err="1">
-                <a:solidFill>
-                  <a:prstClr val="black"/>
-                </a:solidFill>
-                <a:latin typeface="Arial" panose="020B0604020202020204" pitchFamily="34" charset="0"/>
-                <a:cs typeface="Arial" panose="020B0604020202020204" pitchFamily="34" charset="0"/>
-              </a:rPr>
-              <a:t>eros</a:t>
-            </a:r>
-            <a:r>
-              <a:rPr lang="de-DE" sz="1800" dirty="0">
-                <a:solidFill>
-                  <a:prstClr val="black"/>
-                </a:solidFill>
-                <a:latin typeface="Arial" panose="020B0604020202020204" pitchFamily="34" charset="0"/>
-                <a:cs typeface="Arial" panose="020B0604020202020204" pitchFamily="34" charset="0"/>
-              </a:rPr>
-              <a:t>, </a:t>
-            </a:r>
-            <a:r>
-              <a:rPr lang="de-DE" sz="1800" dirty="0" err="1">
-                <a:solidFill>
-                  <a:prstClr val="black"/>
-                </a:solidFill>
-                <a:latin typeface="Arial" panose="020B0604020202020204" pitchFamily="34" charset="0"/>
-                <a:cs typeface="Arial" panose="020B0604020202020204" pitchFamily="34" charset="0"/>
-              </a:rPr>
-              <a:t>rutrum</a:t>
-            </a:r>
-            <a:r>
-              <a:rPr lang="de-DE" sz="1800" dirty="0">
-                <a:solidFill>
-                  <a:prstClr val="black"/>
-                </a:solidFill>
-                <a:latin typeface="Arial" panose="020B0604020202020204" pitchFamily="34" charset="0"/>
-                <a:cs typeface="Arial" panose="020B0604020202020204" pitchFamily="34" charset="0"/>
-              </a:rPr>
-              <a:t> </a:t>
-            </a:r>
-            <a:r>
-              <a:rPr lang="de-DE" sz="1800" dirty="0" err="1">
-                <a:solidFill>
-                  <a:prstClr val="black"/>
-                </a:solidFill>
-                <a:latin typeface="Arial" panose="020B0604020202020204" pitchFamily="34" charset="0"/>
-                <a:cs typeface="Arial" panose="020B0604020202020204" pitchFamily="34" charset="0"/>
-              </a:rPr>
-              <a:t>gravida</a:t>
-            </a:r>
-            <a:r>
-              <a:rPr lang="de-DE" sz="1800" dirty="0">
-                <a:solidFill>
-                  <a:prstClr val="black"/>
-                </a:solidFill>
-                <a:latin typeface="Arial" panose="020B0604020202020204" pitchFamily="34" charset="0"/>
-                <a:cs typeface="Arial" panose="020B0604020202020204" pitchFamily="34" charset="0"/>
-              </a:rPr>
-              <a:t> </a:t>
-            </a:r>
-            <a:r>
-              <a:rPr lang="de-DE" sz="1800" dirty="0" err="1">
-                <a:solidFill>
-                  <a:prstClr val="black"/>
-                </a:solidFill>
-                <a:latin typeface="Arial" panose="020B0604020202020204" pitchFamily="34" charset="0"/>
-                <a:cs typeface="Arial" panose="020B0604020202020204" pitchFamily="34" charset="0"/>
-              </a:rPr>
-              <a:t>ipsum</a:t>
-            </a:r>
-            <a:r>
-              <a:rPr lang="de-DE" sz="1800" dirty="0">
-                <a:solidFill>
-                  <a:prstClr val="black"/>
-                </a:solidFill>
-                <a:latin typeface="Arial" panose="020B0604020202020204" pitchFamily="34" charset="0"/>
-                <a:cs typeface="Arial" panose="020B0604020202020204" pitchFamily="34" charset="0"/>
-              </a:rPr>
-              <a:t> </a:t>
-            </a:r>
-            <a:r>
-              <a:rPr lang="de-DE" sz="1800" dirty="0" err="1">
-                <a:solidFill>
-                  <a:prstClr val="black"/>
-                </a:solidFill>
-                <a:latin typeface="Arial" panose="020B0604020202020204" pitchFamily="34" charset="0"/>
-                <a:cs typeface="Arial" panose="020B0604020202020204" pitchFamily="34" charset="0"/>
-              </a:rPr>
-              <a:t>blandit</a:t>
-            </a:r>
-            <a:r>
-              <a:rPr lang="de-DE" sz="1800" dirty="0">
-                <a:solidFill>
-                  <a:prstClr val="black"/>
-                </a:solidFill>
-                <a:latin typeface="Arial" panose="020B0604020202020204" pitchFamily="34" charset="0"/>
-                <a:cs typeface="Arial" panose="020B0604020202020204" pitchFamily="34" charset="0"/>
-              </a:rPr>
-              <a:t> </a:t>
-            </a:r>
-            <a:r>
-              <a:rPr lang="de-DE" sz="1800" dirty="0" err="1">
-                <a:solidFill>
-                  <a:prstClr val="black"/>
-                </a:solidFill>
-                <a:latin typeface="Arial" panose="020B0604020202020204" pitchFamily="34" charset="0"/>
-                <a:cs typeface="Arial" panose="020B0604020202020204" pitchFamily="34" charset="0"/>
-              </a:rPr>
-              <a:t>vitae</a:t>
-            </a:r>
-            <a:r>
-              <a:rPr lang="de-DE" sz="1800" dirty="0">
-                <a:solidFill>
-                  <a:prstClr val="black"/>
-                </a:solidFill>
-                <a:latin typeface="Arial" panose="020B0604020202020204" pitchFamily="34" charset="0"/>
-                <a:cs typeface="Arial" panose="020B0604020202020204" pitchFamily="34" charset="0"/>
-              </a:rPr>
-              <a:t>. </a:t>
-            </a:r>
-            <a:r>
-              <a:rPr lang="de-DE" sz="1800" dirty="0" err="1">
-                <a:solidFill>
-                  <a:prstClr val="black"/>
-                </a:solidFill>
-                <a:latin typeface="Arial" panose="020B0604020202020204" pitchFamily="34" charset="0"/>
-                <a:cs typeface="Arial" panose="020B0604020202020204" pitchFamily="34" charset="0"/>
-              </a:rPr>
-              <a:t>Quisque</a:t>
-            </a:r>
-            <a:r>
-              <a:rPr lang="de-DE" sz="1800" dirty="0">
-                <a:solidFill>
-                  <a:prstClr val="black"/>
-                </a:solidFill>
-                <a:latin typeface="Arial" panose="020B0604020202020204" pitchFamily="34" charset="0"/>
-                <a:cs typeface="Arial" panose="020B0604020202020204" pitchFamily="34" charset="0"/>
-              </a:rPr>
-              <a:t> </a:t>
-            </a:r>
-            <a:r>
-              <a:rPr lang="de-DE" sz="1800" dirty="0" err="1">
-                <a:solidFill>
-                  <a:prstClr val="black"/>
-                </a:solidFill>
-                <a:latin typeface="Arial" panose="020B0604020202020204" pitchFamily="34" charset="0"/>
-                <a:cs typeface="Arial" panose="020B0604020202020204" pitchFamily="34" charset="0"/>
-              </a:rPr>
-              <a:t>adipiscing</a:t>
-            </a:r>
-            <a:r>
-              <a:rPr lang="de-DE" sz="1800" dirty="0">
-                <a:solidFill>
-                  <a:prstClr val="black"/>
-                </a:solidFill>
-                <a:latin typeface="Arial" panose="020B0604020202020204" pitchFamily="34" charset="0"/>
-                <a:cs typeface="Arial" panose="020B0604020202020204" pitchFamily="34" charset="0"/>
-              </a:rPr>
-              <a:t>, </a:t>
-            </a:r>
-            <a:r>
-              <a:rPr lang="de-DE" sz="1800" dirty="0" err="1">
-                <a:solidFill>
-                  <a:prstClr val="black"/>
-                </a:solidFill>
-                <a:latin typeface="Arial" panose="020B0604020202020204" pitchFamily="34" charset="0"/>
-                <a:cs typeface="Arial" panose="020B0604020202020204" pitchFamily="34" charset="0"/>
-              </a:rPr>
-              <a:t>dui</a:t>
-            </a:r>
-            <a:r>
-              <a:rPr lang="de-DE" sz="1800" dirty="0">
-                <a:solidFill>
-                  <a:prstClr val="black"/>
-                </a:solidFill>
-                <a:latin typeface="Arial" panose="020B0604020202020204" pitchFamily="34" charset="0"/>
-                <a:cs typeface="Arial" panose="020B0604020202020204" pitchFamily="34" charset="0"/>
-              </a:rPr>
-              <a:t> </a:t>
-            </a:r>
-            <a:r>
-              <a:rPr lang="de-DE" sz="1800" dirty="0" err="1">
-                <a:solidFill>
-                  <a:prstClr val="black"/>
-                </a:solidFill>
-                <a:latin typeface="Arial" panose="020B0604020202020204" pitchFamily="34" charset="0"/>
-                <a:cs typeface="Arial" panose="020B0604020202020204" pitchFamily="34" charset="0"/>
-              </a:rPr>
-              <a:t>quis</a:t>
-            </a:r>
-            <a:r>
-              <a:rPr lang="de-DE" sz="1800" dirty="0">
-                <a:solidFill>
-                  <a:prstClr val="black"/>
-                </a:solidFill>
-                <a:latin typeface="Arial" panose="020B0604020202020204" pitchFamily="34" charset="0"/>
-                <a:cs typeface="Arial" panose="020B0604020202020204" pitchFamily="34" charset="0"/>
-              </a:rPr>
-              <a:t> </a:t>
-            </a:r>
-            <a:r>
-              <a:rPr lang="de-DE" sz="1800" dirty="0" err="1">
-                <a:solidFill>
-                  <a:prstClr val="black"/>
-                </a:solidFill>
-                <a:latin typeface="Arial" panose="020B0604020202020204" pitchFamily="34" charset="0"/>
-                <a:cs typeface="Arial" panose="020B0604020202020204" pitchFamily="34" charset="0"/>
-              </a:rPr>
-              <a:t>fermentum</a:t>
-            </a:r>
-            <a:r>
-              <a:rPr lang="de-DE" sz="1800" dirty="0">
-                <a:solidFill>
-                  <a:prstClr val="black"/>
-                </a:solidFill>
-                <a:latin typeface="Arial" panose="020B0604020202020204" pitchFamily="34" charset="0"/>
-                <a:cs typeface="Arial" panose="020B0604020202020204" pitchFamily="34" charset="0"/>
-              </a:rPr>
-              <a:t> </a:t>
-            </a:r>
-            <a:r>
-              <a:rPr lang="de-DE" sz="1800" dirty="0" err="1">
-                <a:solidFill>
-                  <a:prstClr val="black"/>
-                </a:solidFill>
-                <a:latin typeface="Arial" panose="020B0604020202020204" pitchFamily="34" charset="0"/>
-                <a:cs typeface="Arial" panose="020B0604020202020204" pitchFamily="34" charset="0"/>
-              </a:rPr>
-              <a:t>ultricies</a:t>
-            </a:r>
-            <a:r>
-              <a:rPr lang="de-DE" sz="1800" dirty="0">
-                <a:solidFill>
-                  <a:prstClr val="black"/>
-                </a:solidFill>
-                <a:latin typeface="Arial" panose="020B0604020202020204" pitchFamily="34" charset="0"/>
-                <a:cs typeface="Arial" panose="020B0604020202020204" pitchFamily="34" charset="0"/>
-              </a:rPr>
-              <a:t>, </a:t>
-            </a:r>
-            <a:r>
-              <a:rPr lang="de-DE" sz="1800" dirty="0" err="1">
-                <a:solidFill>
-                  <a:prstClr val="black"/>
-                </a:solidFill>
-                <a:latin typeface="Arial" panose="020B0604020202020204" pitchFamily="34" charset="0"/>
-                <a:cs typeface="Arial" panose="020B0604020202020204" pitchFamily="34" charset="0"/>
-              </a:rPr>
-              <a:t>dolor</a:t>
-            </a:r>
-            <a:r>
-              <a:rPr lang="de-DE" sz="1800" dirty="0">
-                <a:solidFill>
-                  <a:prstClr val="black"/>
-                </a:solidFill>
-                <a:latin typeface="Arial" panose="020B0604020202020204" pitchFamily="34" charset="0"/>
-                <a:cs typeface="Arial" panose="020B0604020202020204" pitchFamily="34" charset="0"/>
-              </a:rPr>
-              <a:t> ante</a:t>
-            </a:r>
-            <a:endParaRPr lang="de-DE" sz="1800" dirty="0">
+              <a:t>Realisierungstools:</a:t>
+            </a:r>
+            <a:endParaRPr lang="de-DE" sz="2800" b="1" dirty="0">
               <a:latin typeface="Arial" panose="020B0604020202020204" pitchFamily="34" charset="0"/>
               <a:cs typeface="Arial" panose="020B0604020202020204" pitchFamily="34" charset="0"/>
             </a:endParaRPr>
@@ -10056,7 +8064,7 @@
           <p:nvPr/>
         </p:nvPicPr>
         <p:blipFill>
-          <a:blip r:embed="rId5">
+          <a:blip r:embed="rId4">
             <a:extLst>
               <a:ext uri="{28A0092B-C50C-407E-A947-70E740481C1C}">
                 <a14:useLocalDpi xmlns:a14="http://schemas.microsoft.com/office/drawing/2010/main" val="0"/>
@@ -10099,8 +8107,8 @@
         </p:blipFill>
         <p:spPr>
           <a:xfrm>
-            <a:off x="252017" y="2088283"/>
-            <a:ext cx="20810312" cy="581106"/>
+            <a:off x="146104" y="2040347"/>
+            <a:ext cx="20950131" cy="581106"/>
           </a:xfrm>
           <a:prstGeom prst="rect">
             <a:avLst/>
@@ -10115,8 +8123,8 @@
         </p:nvSpPr>
         <p:spPr>
           <a:xfrm>
-            <a:off x="14725625" y="2923174"/>
-            <a:ext cx="6206449" cy="8880467"/>
+            <a:off x="14429479" y="2897158"/>
+            <a:ext cx="6502595" cy="8799943"/>
           </a:xfrm>
           <a:prstGeom prst="rect">
             <a:avLst/>
@@ -10155,35 +8163,26 @@
       </p:sp>
       <p:sp>
         <p:nvSpPr>
-          <p:cNvPr id="25" name="Rechteck 24"/>
+          <p:cNvPr id="26" name="Rechteck 25"/>
           <p:cNvSpPr/>
           <p:nvPr/>
         </p:nvSpPr>
         <p:spPr>
           <a:xfrm>
-            <a:off x="15229681" y="7600260"/>
-            <a:ext cx="5256584" cy="3539465"/>
+            <a:off x="247771" y="2879073"/>
+            <a:ext cx="13707066" cy="8259353"/>
           </a:xfrm>
           <a:prstGeom prst="rect">
             <a:avLst/>
           </a:prstGeom>
           <a:solidFill>
-            <a:schemeClr val="bg1">
-              <a:lumMod val="75000"/>
-            </a:schemeClr>
+            <a:srgbClr val="515151"/>
           </a:solidFill>
           <a:ln>
             <a:solidFill>
-              <a:schemeClr val="tx1"/>
+              <a:srgbClr val="515151"/>
             </a:solidFill>
           </a:ln>
-          <a:scene3d>
-            <a:camera prst="orthographicFront"/>
-            <a:lightRig rig="threePt" dir="t"/>
-          </a:scene3d>
-          <a:sp3d>
-            <a:bevelT/>
-          </a:sp3d>
         </p:spPr>
         <p:style>
           <a:lnRef idx="2">
@@ -10206,78 +8205,20 @@
           <a:lstStyle/>
           <a:p>
             <a:pPr algn="ctr"/>
-            <a:r>
-              <a:rPr lang="de-DE" dirty="0">
-                <a:ln w="0"/>
-                <a:solidFill>
-                  <a:schemeClr val="tx1"/>
-                </a:solidFill>
-                <a:effectLst>
-                  <a:outerShdw blurRad="38100" dist="19050" dir="2700000" algn="tl" rotWithShape="0">
-                    <a:schemeClr val="dk1">
-                      <a:alpha val="40000"/>
-                    </a:schemeClr>
-                  </a:outerShdw>
-                </a:effectLst>
-              </a:rPr>
-              <a:t>QR-Code</a:t>
-            </a:r>
-          </a:p>
-        </p:txBody>
-      </p:sp>
-      <p:sp>
-        <p:nvSpPr>
-          <p:cNvPr id="26" name="Rechteck 25"/>
-          <p:cNvSpPr/>
-          <p:nvPr/>
-        </p:nvSpPr>
-        <p:spPr>
-          <a:xfrm>
-            <a:off x="396033" y="2880371"/>
-            <a:ext cx="13707066" cy="8259353"/>
-          </a:xfrm>
-          <a:prstGeom prst="rect">
-            <a:avLst/>
-          </a:prstGeom>
-          <a:solidFill>
-            <a:srgbClr val="515151"/>
-          </a:solidFill>
-        </p:spPr>
-        <p:style>
-          <a:lnRef idx="2">
-            <a:schemeClr val="accent1">
-              <a:shade val="50000"/>
-            </a:schemeClr>
-          </a:lnRef>
-          <a:fillRef idx="1">
-            <a:schemeClr val="accent1"/>
-          </a:fillRef>
-          <a:effectRef idx="0">
-            <a:schemeClr val="accent1"/>
-          </a:effectRef>
-          <a:fontRef idx="minor">
-            <a:schemeClr val="lt1"/>
-          </a:fontRef>
-        </p:style>
-        <p:txBody>
-          <a:bodyPr rtlCol="0" anchor="ctr"/>
-          <a:lstStyle/>
-          <a:p>
-            <a:pPr algn="ctr"/>
             <a:endParaRPr lang="de-DE"/>
           </a:p>
         </p:txBody>
       </p:sp>
       <p:pic>
         <p:nvPicPr>
-          <p:cNvPr id="35" name="Grafik 34"/>
+          <p:cNvPr id="28" name="Grafik 27"/>
           <p:cNvPicPr>
             <a:picLocks noChangeAspect="1"/>
           </p:cNvPicPr>
           <p:nvPr/>
         </p:nvPicPr>
         <p:blipFill>
-          <a:blip r:embed="rId3">
+          <a:blip r:embed="rId5">
             <a:extLst>
               <a:ext uri="{28A0092B-C50C-407E-A947-70E740481C1C}">
                 <a14:useLocalDpi xmlns:a14="http://schemas.microsoft.com/office/drawing/2010/main" val="0"/>
@@ -10290,37 +8231,7 @@
         </p:blipFill>
         <p:spPr>
           <a:xfrm>
-            <a:off x="368559" y="11348110"/>
-            <a:ext cx="14084480" cy="393295"/>
-          </a:xfrm>
-          <a:prstGeom prst="rect">
-            <a:avLst/>
-          </a:prstGeom>
-        </p:spPr>
-      </p:pic>
-      <p:pic>
-        <p:nvPicPr>
-          <p:cNvPr id="28" name="Grafik 27"/>
-          <p:cNvPicPr>
-            <a:picLocks noChangeAspect="1"/>
-          </p:cNvPicPr>
-          <p:nvPr/>
-        </p:nvPicPr>
-        <p:blipFill>
-          <a:blip r:embed="rId6">
-            <a:extLst>
-              <a:ext uri="{28A0092B-C50C-407E-A947-70E740481C1C}">
-                <a14:useLocalDpi xmlns:a14="http://schemas.microsoft.com/office/drawing/2010/main" val="0"/>
-              </a:ext>
-            </a:extLst>
-          </a:blip>
-          <a:stretch>
-            <a:fillRect/>
-          </a:stretch>
-        </p:blipFill>
-        <p:spPr>
-          <a:xfrm>
-            <a:off x="2203371" y="3077692"/>
+            <a:off x="2055109" y="3076394"/>
             <a:ext cx="9948373" cy="6707504"/>
           </a:xfrm>
           <a:prstGeom prst="rect">
@@ -10336,7 +8247,7 @@
         </p:nvSpPr>
         <p:spPr>
           <a:xfrm>
-            <a:off x="13109575" y="5829732"/>
+            <a:off x="12961313" y="5828434"/>
             <a:ext cx="439189" cy="1092405"/>
           </a:xfrm>
           <a:prstGeom prst="chevron">
@@ -10388,7 +8299,7 @@
         </p:nvSpPr>
         <p:spPr>
           <a:xfrm flipH="1">
-            <a:off x="1008100" y="5829733"/>
+            <a:off x="859838" y="5828435"/>
             <a:ext cx="439189" cy="1092405"/>
           </a:xfrm>
           <a:prstGeom prst="chevron">
@@ -10441,6 +8352,36 @@
           <p:nvPr/>
         </p:nvPicPr>
         <p:blipFill>
+          <a:blip r:embed="rId6" cstate="print">
+            <a:extLst>
+              <a:ext uri="{28A0092B-C50C-407E-A947-70E740481C1C}">
+                <a14:useLocalDpi xmlns:a14="http://schemas.microsoft.com/office/drawing/2010/main" val="0"/>
+              </a:ext>
+            </a:extLst>
+          </a:blip>
+          <a:stretch>
+            <a:fillRect/>
+          </a:stretch>
+        </p:blipFill>
+        <p:spPr>
+          <a:xfrm>
+            <a:off x="429863" y="9813734"/>
+            <a:ext cx="1889493" cy="1281380"/>
+          </a:xfrm>
+          <a:prstGeom prst="rect">
+            <a:avLst/>
+          </a:prstGeom>
+        </p:spPr>
+      </p:pic>
+      <p:pic>
+        <p:nvPicPr>
+          <p:cNvPr id="33" name="Grafik 32"/>
+          <p:cNvPicPr>
+            <a:picLocks noChangeAspect="1"/>
+          </p:cNvPicPr>
+          <p:nvPr/>
+        </p:nvPicPr>
+        <p:blipFill>
           <a:blip r:embed="rId7" cstate="print">
             <a:extLst>
               <a:ext uri="{28A0092B-C50C-407E-A947-70E740481C1C}">
@@ -10454,8 +8395,8 @@
         </p:blipFill>
         <p:spPr>
           <a:xfrm>
-            <a:off x="578125" y="9815032"/>
-            <a:ext cx="1889493" cy="1281380"/>
+            <a:off x="2447927" y="9816561"/>
+            <a:ext cx="1904300" cy="1291368"/>
           </a:xfrm>
           <a:prstGeom prst="rect">
             <a:avLst/>
@@ -10464,7 +8405,7 @@
       </p:pic>
       <p:pic>
         <p:nvPicPr>
-          <p:cNvPr id="33" name="Grafik 32"/>
+          <p:cNvPr id="36" name="Grafik 35"/>
           <p:cNvPicPr>
             <a:picLocks noChangeAspect="1"/>
           </p:cNvPicPr>
@@ -10484,8 +8425,8 @@
         </p:blipFill>
         <p:spPr>
           <a:xfrm>
-            <a:off x="2596189" y="9817859"/>
-            <a:ext cx="1904300" cy="1291368"/>
+            <a:off x="4480798" y="9817480"/>
+            <a:ext cx="2232248" cy="1255027"/>
           </a:xfrm>
           <a:prstGeom prst="rect">
             <a:avLst/>
@@ -10494,7 +8435,7 @@
       </p:pic>
       <p:pic>
         <p:nvPicPr>
-          <p:cNvPr id="36" name="Grafik 35"/>
+          <p:cNvPr id="38" name="Grafik 37"/>
           <p:cNvPicPr>
             <a:picLocks noChangeAspect="1"/>
           </p:cNvPicPr>
@@ -10514,8 +8455,8 @@
         </p:blipFill>
         <p:spPr>
           <a:xfrm>
-            <a:off x="4629060" y="9818778"/>
-            <a:ext cx="2232248" cy="1255027"/>
+            <a:off x="6837255" y="9823574"/>
+            <a:ext cx="1475412" cy="1245351"/>
           </a:xfrm>
           <a:prstGeom prst="rect">
             <a:avLst/>
@@ -10524,7 +8465,7 @@
       </p:pic>
       <p:pic>
         <p:nvPicPr>
-          <p:cNvPr id="38" name="Grafik 37"/>
+          <p:cNvPr id="41" name="Grafik 40"/>
           <p:cNvPicPr>
             <a:picLocks noChangeAspect="1"/>
           </p:cNvPicPr>
@@ -10544,8 +8485,8 @@
         </p:blipFill>
         <p:spPr>
           <a:xfrm>
-            <a:off x="6985517" y="9824872"/>
-            <a:ext cx="1475412" cy="1245351"/>
+            <a:off x="8436876" y="9819500"/>
+            <a:ext cx="1746826" cy="1227638"/>
           </a:xfrm>
           <a:prstGeom prst="rect">
             <a:avLst/>
@@ -10554,14 +8495,14 @@
       </p:pic>
       <p:pic>
         <p:nvPicPr>
-          <p:cNvPr id="41" name="Grafik 40"/>
+          <p:cNvPr id="8" name="Grafik 7"/>
           <p:cNvPicPr>
             <a:picLocks noChangeAspect="1"/>
           </p:cNvPicPr>
           <p:nvPr/>
         </p:nvPicPr>
         <p:blipFill>
-          <a:blip r:embed="rId11" cstate="print">
+          <a:blip r:embed="rId11">
             <a:extLst>
               <a:ext uri="{28A0092B-C50C-407E-A947-70E740481C1C}">
                 <a14:useLocalDpi xmlns:a14="http://schemas.microsoft.com/office/drawing/2010/main" val="0"/>
@@ -10574,68 +8515,17 @@
         </p:blipFill>
         <p:spPr>
           <a:xfrm>
-            <a:off x="8585138" y="9820798"/>
-            <a:ext cx="1746826" cy="1227638"/>
+            <a:off x="16270790" y="11195099"/>
+            <a:ext cx="2819971" cy="398240"/>
           </a:xfrm>
           <a:prstGeom prst="rect">
             <a:avLst/>
           </a:prstGeom>
         </p:spPr>
       </p:pic>
-      <p:sp>
-        <p:nvSpPr>
-          <p:cNvPr id="42" name="Textfeld 41"/>
-          <p:cNvSpPr txBox="1"/>
-          <p:nvPr/>
-        </p:nvSpPr>
-        <p:spPr>
-          <a:xfrm>
-            <a:off x="396033" y="12817475"/>
-            <a:ext cx="19992681" cy="1754326"/>
-          </a:xfrm>
-          <a:prstGeom prst="rect">
-            <a:avLst/>
-          </a:prstGeom>
-          <a:noFill/>
-        </p:spPr>
-        <p:txBody>
-          <a:bodyPr wrap="square" rtlCol="0">
-            <a:spAutoFit/>
-          </a:bodyPr>
-          <a:lstStyle/>
-          <a:p>
-            <a:pPr>
-              <a:lnSpc>
-                <a:spcPct val="150000"/>
-              </a:lnSpc>
-            </a:pPr>
-            <a:r>
-              <a:rPr lang="de-DE" sz="3600" dirty="0">
-                <a:latin typeface="Arial" panose="020B0604020202020204" pitchFamily="34" charset="0"/>
-                <a:cs typeface="Arial" panose="020B0604020202020204" pitchFamily="34" charset="0"/>
-              </a:rPr>
-              <a:t>Praktikum der Veranstaltung Fortgeschrittene Softwaretechnologie, Sommersemester 2017</a:t>
-            </a:r>
-          </a:p>
-          <a:p>
-            <a:pPr>
-              <a:lnSpc>
-                <a:spcPct val="150000"/>
-              </a:lnSpc>
-            </a:pPr>
-            <a:r>
-              <a:rPr lang="de-DE" sz="3600" dirty="0">
-                <a:latin typeface="Arial" panose="020B0604020202020204" pitchFamily="34" charset="0"/>
-                <a:cs typeface="Arial" panose="020B0604020202020204" pitchFamily="34" charset="0"/>
-              </a:rPr>
-              <a:t>Verbundstudium Wirtschaftsinformatik Master</a:t>
-            </a:r>
-          </a:p>
-        </p:txBody>
-      </p:sp>
       <p:pic>
         <p:nvPicPr>
-          <p:cNvPr id="8" name="Grafik 7"/>
+          <p:cNvPr id="11" name="Grafik 10"/>
           <p:cNvPicPr>
             <a:picLocks noChangeAspect="1"/>
           </p:cNvPicPr>
@@ -10655,8 +8545,8 @@
         </p:blipFill>
         <p:spPr>
           <a:xfrm>
-            <a:off x="9962110" y="14019716"/>
-            <a:ext cx="2819971" cy="398240"/>
+            <a:off x="15984002" y="10370302"/>
+            <a:ext cx="1668304" cy="645795"/>
           </a:xfrm>
           <a:prstGeom prst="rect">
             <a:avLst/>
@@ -10665,14 +8555,14 @@
       </p:pic>
       <p:pic>
         <p:nvPicPr>
-          <p:cNvPr id="11" name="Grafik 10"/>
+          <p:cNvPr id="44" name="Grafik 43"/>
           <p:cNvPicPr>
             <a:picLocks noChangeAspect="1"/>
           </p:cNvPicPr>
           <p:nvPr/>
         </p:nvPicPr>
         <p:blipFill>
-          <a:blip r:embed="rId13">
+          <a:blip r:embed="rId13" cstate="print">
             <a:extLst>
               <a:ext uri="{28A0092B-C50C-407E-A947-70E740481C1C}">
                 <a14:useLocalDpi xmlns:a14="http://schemas.microsoft.com/office/drawing/2010/main" val="0"/>
@@ -10685,17 +8575,141 @@
         </p:blipFill>
         <p:spPr>
           <a:xfrm>
-            <a:off x="13109575" y="13859164"/>
-            <a:ext cx="1668304" cy="645795"/>
+            <a:off x="18244022" y="10368744"/>
+            <a:ext cx="1083793" cy="586991"/>
           </a:xfrm>
           <a:prstGeom prst="rect">
             <a:avLst/>
           </a:prstGeom>
         </p:spPr>
       </p:pic>
+      <p:sp>
+        <p:nvSpPr>
+          <p:cNvPr id="45" name="Textfeld 44"/>
+          <p:cNvSpPr txBox="1"/>
+          <p:nvPr/>
+        </p:nvSpPr>
+        <p:spPr>
+          <a:xfrm>
+            <a:off x="470465" y="13062629"/>
+            <a:ext cx="3948517" cy="769441"/>
+          </a:xfrm>
+          <a:prstGeom prst="rect">
+            <a:avLst/>
+          </a:prstGeom>
+          <a:noFill/>
+        </p:spPr>
+        <p:txBody>
+          <a:bodyPr wrap="none" rtlCol="0">
+            <a:spAutoFit/>
+          </a:bodyPr>
+          <a:lstStyle/>
+          <a:p>
+            <a:r>
+              <a:rPr lang="de-DE" sz="4400" b="1" dirty="0">
+                <a:latin typeface="Arial" panose="020B0604020202020204" pitchFamily="34" charset="0"/>
+                <a:cs typeface="Arial" panose="020B0604020202020204" pitchFamily="34" charset="0"/>
+              </a:rPr>
+              <a:t>Produktvision</a:t>
+            </a:r>
+            <a:endParaRPr lang="de-DE" b="1" dirty="0">
+              <a:latin typeface="Arial" panose="020B0604020202020204" pitchFamily="34" charset="0"/>
+              <a:cs typeface="Arial" panose="020B0604020202020204" pitchFamily="34" charset="0"/>
+            </a:endParaRPr>
+          </a:p>
+        </p:txBody>
+      </p:sp>
+      <p:sp>
+        <p:nvSpPr>
+          <p:cNvPr id="46" name="Textfeld 45"/>
+          <p:cNvSpPr txBox="1"/>
+          <p:nvPr/>
+        </p:nvSpPr>
+        <p:spPr>
+          <a:xfrm>
+            <a:off x="253901" y="13802289"/>
+            <a:ext cx="14026662" cy="2246769"/>
+          </a:xfrm>
+          <a:prstGeom prst="rect">
+            <a:avLst/>
+          </a:prstGeom>
+          <a:noFill/>
+        </p:spPr>
+        <p:txBody>
+          <a:bodyPr wrap="square" rtlCol="0">
+            <a:spAutoFit/>
+          </a:bodyPr>
+          <a:lstStyle/>
+          <a:p>
+            <a:pPr marL="457200" lvl="0" indent="-457200" algn="ctr">
+              <a:buFont typeface="Arial" panose="020B0604020202020204" pitchFamily="34" charset="0"/>
+              <a:buChar char="•"/>
+            </a:pPr>
+            <a:r>
+              <a:rPr lang="de-DE" sz="2800" dirty="0">
+                <a:latin typeface="Arial" panose="020B0604020202020204" pitchFamily="34" charset="0"/>
+                <a:cs typeface="Arial" panose="020B0604020202020204" pitchFamily="34" charset="0"/>
+              </a:rPr>
+              <a:t>Bündeln von Suchergebnissen verschiedener Quellen auf einem Portal</a:t>
+            </a:r>
+          </a:p>
+          <a:p>
+            <a:pPr marL="457200" lvl="0" indent="-457200" algn="ctr">
+              <a:buFont typeface="Arial" panose="020B0604020202020204" pitchFamily="34" charset="0"/>
+              <a:buChar char="•"/>
+            </a:pPr>
+            <a:r>
+              <a:rPr lang="de-DE" sz="2800" dirty="0">
+                <a:latin typeface="Arial" panose="020B0604020202020204" pitchFamily="34" charset="0"/>
+                <a:cs typeface="Arial" panose="020B0604020202020204" pitchFamily="34" charset="0"/>
+              </a:rPr>
+              <a:t>Verwalten von Benutzern</a:t>
+            </a:r>
+          </a:p>
+          <a:p>
+            <a:pPr marL="457200" lvl="0" indent="-457200" algn="ctr">
+              <a:buFont typeface="Arial" panose="020B0604020202020204" pitchFamily="34" charset="0"/>
+              <a:buChar char="•"/>
+            </a:pPr>
+            <a:r>
+              <a:rPr lang="de-DE" sz="2800" dirty="0">
+                <a:latin typeface="Arial" panose="020B0604020202020204" pitchFamily="34" charset="0"/>
+                <a:cs typeface="Arial" panose="020B0604020202020204" pitchFamily="34" charset="0"/>
+              </a:rPr>
+              <a:t>Verwalten von Suchprofilen (Ablegen von Suchparametern)</a:t>
+            </a:r>
+          </a:p>
+          <a:p>
+            <a:pPr marL="457200" lvl="0" indent="-457200" algn="ctr">
+              <a:buFont typeface="Arial" panose="020B0604020202020204" pitchFamily="34" charset="0"/>
+              <a:buChar char="•"/>
+            </a:pPr>
+            <a:r>
+              <a:rPr lang="de-DE" sz="2800" dirty="0">
+                <a:latin typeface="Arial" panose="020B0604020202020204" pitchFamily="34" charset="0"/>
+                <a:cs typeface="Arial" panose="020B0604020202020204" pitchFamily="34" charset="0"/>
+              </a:rPr>
+              <a:t>Benachrichtigung über zum Suchprofil passenden Immobilien</a:t>
+            </a:r>
+          </a:p>
+          <a:p>
+            <a:pPr marL="457200" lvl="0" indent="-457200" algn="ctr">
+              <a:buFont typeface="Arial" panose="020B0604020202020204" pitchFamily="34" charset="0"/>
+              <a:buChar char="•"/>
+            </a:pPr>
+            <a:r>
+              <a:rPr lang="de-DE" sz="2800" dirty="0">
+                <a:latin typeface="Arial" panose="020B0604020202020204" pitchFamily="34" charset="0"/>
+                <a:cs typeface="Arial" panose="020B0604020202020204" pitchFamily="34" charset="0"/>
+              </a:rPr>
+              <a:t>Vereinheitlichung der Informationen einer Immobilie (evtl. in einer späteren Phase)</a:t>
+            </a:r>
+          </a:p>
+        </p:txBody>
+      </p:sp>
       <p:pic>
         <p:nvPicPr>
-          <p:cNvPr id="44" name="Grafik 43"/>
+          <p:cNvPr id="9" name="Grafik 8"/>
           <p:cNvPicPr>
             <a:picLocks noChangeAspect="1"/>
           </p:cNvPicPr>
@@ -10715,164 +8729,7 @@
         </p:blipFill>
         <p:spPr>
           <a:xfrm>
-            <a:off x="15105373" y="13834971"/>
-            <a:ext cx="1083793" cy="586991"/>
-          </a:xfrm>
-          <a:prstGeom prst="rect">
-            <a:avLst/>
-          </a:prstGeom>
-        </p:spPr>
-      </p:pic>
-      <p:sp>
-        <p:nvSpPr>
-          <p:cNvPr id="45" name="Textfeld 44"/>
-          <p:cNvSpPr txBox="1"/>
-          <p:nvPr/>
-        </p:nvSpPr>
-        <p:spPr>
-          <a:xfrm>
-            <a:off x="324025" y="14649463"/>
-            <a:ext cx="3948517" cy="769441"/>
-          </a:xfrm>
-          <a:prstGeom prst="rect">
-            <a:avLst/>
-          </a:prstGeom>
-          <a:noFill/>
-        </p:spPr>
-        <p:txBody>
-          <a:bodyPr wrap="none" rtlCol="0">
-            <a:spAutoFit/>
-          </a:bodyPr>
-          <a:lstStyle/>
-          <a:p>
-            <a:r>
-              <a:rPr lang="de-DE" sz="4400" b="1" dirty="0">
-                <a:latin typeface="Arial" panose="020B0604020202020204" pitchFamily="34" charset="0"/>
-                <a:cs typeface="Arial" panose="020B0604020202020204" pitchFamily="34" charset="0"/>
-              </a:rPr>
-              <a:t>Produktvision</a:t>
-            </a:r>
-            <a:endParaRPr lang="de-DE" b="1" dirty="0">
-              <a:latin typeface="Arial" panose="020B0604020202020204" pitchFamily="34" charset="0"/>
-              <a:cs typeface="Arial" panose="020B0604020202020204" pitchFamily="34" charset="0"/>
-            </a:endParaRPr>
-          </a:p>
-        </p:txBody>
-      </p:sp>
-      <p:sp>
-        <p:nvSpPr>
-          <p:cNvPr id="46" name="Textfeld 45"/>
-          <p:cNvSpPr txBox="1"/>
-          <p:nvPr/>
-        </p:nvSpPr>
-        <p:spPr>
-          <a:xfrm>
-            <a:off x="324025" y="15369629"/>
-            <a:ext cx="14201022" cy="3139321"/>
-          </a:xfrm>
-          <a:prstGeom prst="rect">
-            <a:avLst/>
-          </a:prstGeom>
-          <a:noFill/>
-        </p:spPr>
-        <p:txBody>
-          <a:bodyPr wrap="square" rtlCol="0">
-            <a:spAutoFit/>
-          </a:bodyPr>
-          <a:lstStyle/>
-          <a:p>
-            <a:pPr marL="457200" lvl="0" indent="-457200" algn="ctr">
-              <a:buFont typeface="Arial" panose="020B0604020202020204" pitchFamily="34" charset="0"/>
-              <a:buChar char="•"/>
-            </a:pPr>
-            <a:r>
-              <a:rPr lang="de-DE" sz="2800" dirty="0">
-                <a:latin typeface="Arial" panose="020B0604020202020204" pitchFamily="34" charset="0"/>
-                <a:cs typeface="Arial" panose="020B0604020202020204" pitchFamily="34" charset="0"/>
-              </a:rPr>
-              <a:t>Bündeln von Suchergebnissen verschiedener Quellen auf einem Portal</a:t>
-            </a:r>
-          </a:p>
-          <a:p>
-            <a:pPr marL="457200" lvl="0" indent="-457200" algn="ctr">
-              <a:buFont typeface="Arial" panose="020B0604020202020204" pitchFamily="34" charset="0"/>
-              <a:buChar char="•"/>
-            </a:pPr>
-            <a:r>
-              <a:rPr lang="de-DE" sz="2800" dirty="0">
-                <a:latin typeface="Arial" panose="020B0604020202020204" pitchFamily="34" charset="0"/>
-                <a:cs typeface="Arial" panose="020B0604020202020204" pitchFamily="34" charset="0"/>
-              </a:rPr>
-              <a:t>Verwalten von Benutzern</a:t>
-            </a:r>
-          </a:p>
-          <a:p>
-            <a:pPr marL="457200" lvl="0" indent="-457200" algn="ctr">
-              <a:buFont typeface="Arial" panose="020B0604020202020204" pitchFamily="34" charset="0"/>
-              <a:buChar char="•"/>
-            </a:pPr>
-            <a:r>
-              <a:rPr lang="de-DE" sz="2800" dirty="0">
-                <a:latin typeface="Arial" panose="020B0604020202020204" pitchFamily="34" charset="0"/>
-                <a:cs typeface="Arial" panose="020B0604020202020204" pitchFamily="34" charset="0"/>
-              </a:rPr>
-              <a:t>Verwalten von Suchprofilen (Ablegen von Suchparametern)</a:t>
-            </a:r>
-          </a:p>
-          <a:p>
-            <a:pPr marL="457200" lvl="0" indent="-457200" algn="ctr">
-              <a:buFont typeface="Arial" panose="020B0604020202020204" pitchFamily="34" charset="0"/>
-              <a:buChar char="•"/>
-            </a:pPr>
-            <a:r>
-              <a:rPr lang="de-DE" sz="2800" dirty="0">
-                <a:latin typeface="Arial" panose="020B0604020202020204" pitchFamily="34" charset="0"/>
-                <a:cs typeface="Arial" panose="020B0604020202020204" pitchFamily="34" charset="0"/>
-              </a:rPr>
-              <a:t>Benachrichtigung über zum Suchprofil passenden Immobilien</a:t>
-            </a:r>
-          </a:p>
-          <a:p>
-            <a:pPr marL="457200" lvl="0" indent="-457200" algn="ctr">
-              <a:buFont typeface="Arial" panose="020B0604020202020204" pitchFamily="34" charset="0"/>
-              <a:buChar char="•"/>
-            </a:pPr>
-            <a:r>
-              <a:rPr lang="de-DE" sz="2800" dirty="0">
-                <a:latin typeface="Arial" panose="020B0604020202020204" pitchFamily="34" charset="0"/>
-                <a:cs typeface="Arial" panose="020B0604020202020204" pitchFamily="34" charset="0"/>
-              </a:rPr>
-              <a:t>Vereinheitlichung der Informationen einer Immobilie (evtl. in einer späteren Phase)</a:t>
-            </a:r>
-          </a:p>
-          <a:p>
-            <a:endParaRPr lang="de-DE" dirty="0"/>
-          </a:p>
-        </p:txBody>
-      </p:sp>
-      <p:pic>
-        <p:nvPicPr>
-          <p:cNvPr id="9" name="Grafik 8"/>
-          <p:cNvPicPr>
-            <a:picLocks noChangeAspect="1"/>
-          </p:cNvPicPr>
-          <p:nvPr/>
-        </p:nvPicPr>
-        <p:blipFill>
-          <a:blip r:embed="rId15" cstate="print">
-            <a:extLst>
-              <a:ext uri="{28A0092B-C50C-407E-A947-70E740481C1C}">
-                <a14:useLocalDpi xmlns:a14="http://schemas.microsoft.com/office/drawing/2010/main" val="0"/>
-              </a:ext>
-            </a:extLst>
-          </a:blip>
-          <a:stretch>
-            <a:fillRect/>
-          </a:stretch>
-        </p:blipFill>
-        <p:spPr>
-          <a:xfrm>
-            <a:off x="324025" y="21159111"/>
+            <a:off x="470465" y="21288228"/>
             <a:ext cx="6325179" cy="3131244"/>
           </a:xfrm>
           <a:prstGeom prst="rect">
@@ -10889,14 +8746,14 @@
           <p:nvPr/>
         </p:nvPicPr>
         <p:blipFill>
-          <a:blip r:embed="rId16"/>
+          <a:blip r:embed="rId15"/>
           <a:stretch>
             <a:fillRect/>
           </a:stretch>
         </p:blipFill>
         <p:spPr>
           <a:xfrm>
-            <a:off x="328890" y="24958425"/>
+            <a:off x="473672" y="25474666"/>
             <a:ext cx="6325179" cy="3015914"/>
           </a:xfrm>
           <a:prstGeom prst="rect">
@@ -10912,7 +8769,7 @@
         </p:nvSpPr>
         <p:spPr>
           <a:xfrm>
-            <a:off x="252017" y="20290604"/>
+            <a:off x="421356" y="19138584"/>
             <a:ext cx="6402052" cy="923330"/>
           </a:xfrm>
           <a:prstGeom prst="rect">
@@ -10943,7 +8800,19 @@
                 <a:latin typeface="Arial" panose="020B0604020202020204" pitchFamily="34" charset="0"/>
                 <a:cs typeface="Arial" panose="020B0604020202020204" pitchFamily="34" charset="0"/>
               </a:rPr>
-              <a:t> als Tool zur Projektorganisation. Wir haben ein agiles Vorgehensmodell gewählt und </a:t>
+              <a:t> als Tool zur Projektorganisation. </a:t>
+            </a:r>
+          </a:p>
+          <a:p>
+            <a:r>
+              <a:rPr lang="de-DE" sz="1800" dirty="0">
+                <a:solidFill>
+                  <a:prstClr val="black"/>
+                </a:solidFill>
+                <a:latin typeface="Arial" panose="020B0604020202020204" pitchFamily="34" charset="0"/>
+                <a:cs typeface="Arial" panose="020B0604020202020204" pitchFamily="34" charset="0"/>
+              </a:rPr>
+              <a:t>Wir haben ein agiles Vorgehensmodell gewählt und </a:t>
             </a:r>
             <a:r>
               <a:rPr lang="de-DE" sz="1800" dirty="0" err="1">
@@ -10980,7 +8849,7 @@
         </p:nvSpPr>
         <p:spPr>
           <a:xfrm>
-            <a:off x="247152" y="24300327"/>
+            <a:off x="429863" y="24415302"/>
             <a:ext cx="6402052" cy="369332"/>
           </a:xfrm>
           <a:prstGeom prst="rect">
@@ -11018,7 +8887,7 @@
         </p:nvSpPr>
         <p:spPr>
           <a:xfrm>
-            <a:off x="247152" y="28003272"/>
+            <a:off x="429863" y="28478450"/>
             <a:ext cx="6402052" cy="369332"/>
           </a:xfrm>
           <a:prstGeom prst="rect">
@@ -11071,6 +8940,36 @@
       <p:pic>
         <p:nvPicPr>
           <p:cNvPr id="19" name="Grafik 18"/>
+          <p:cNvPicPr>
+            <a:picLocks noChangeAspect="1"/>
+          </p:cNvPicPr>
+          <p:nvPr/>
+        </p:nvPicPr>
+        <p:blipFill>
+          <a:blip r:embed="rId16" cstate="print">
+            <a:extLst>
+              <a:ext uri="{28A0092B-C50C-407E-A947-70E740481C1C}">
+                <a14:useLocalDpi xmlns:a14="http://schemas.microsoft.com/office/drawing/2010/main" val="0"/>
+              </a:ext>
+            </a:extLst>
+          </a:blip>
+          <a:stretch>
+            <a:fillRect/>
+          </a:stretch>
+        </p:blipFill>
+        <p:spPr>
+          <a:xfrm>
+            <a:off x="7460878" y="18937798"/>
+            <a:ext cx="5391695" cy="5477504"/>
+          </a:xfrm>
+          <a:prstGeom prst="rect">
+            <a:avLst/>
+          </a:prstGeom>
+        </p:spPr>
+      </p:pic>
+      <p:pic>
+        <p:nvPicPr>
+          <p:cNvPr id="27" name="Grafik 26"/>
           <p:cNvPicPr>
             <a:picLocks noChangeAspect="1"/>
           </p:cNvPicPr>
@@ -11090,38 +8989,8 @@
         </p:blipFill>
         <p:spPr>
           <a:xfrm>
-            <a:off x="7461722" y="20290604"/>
-            <a:ext cx="4502221" cy="4573874"/>
-          </a:xfrm>
-          <a:prstGeom prst="rect">
-            <a:avLst/>
-          </a:prstGeom>
-        </p:spPr>
-      </p:pic>
-      <p:pic>
-        <p:nvPicPr>
-          <p:cNvPr id="27" name="Grafik 26"/>
-          <p:cNvPicPr>
-            <a:picLocks noChangeAspect="1"/>
-          </p:cNvPicPr>
-          <p:nvPr/>
-        </p:nvPicPr>
-        <p:blipFill>
-          <a:blip r:embed="rId18" cstate="print">
-            <a:extLst>
-              <a:ext uri="{28A0092B-C50C-407E-A947-70E740481C1C}">
-                <a14:useLocalDpi xmlns:a14="http://schemas.microsoft.com/office/drawing/2010/main" val="0"/>
-              </a:ext>
-            </a:extLst>
-          </a:blip>
-          <a:stretch>
-            <a:fillRect/>
-          </a:stretch>
-        </p:blipFill>
-        <p:spPr>
-          <a:xfrm>
-            <a:off x="7481098" y="24958425"/>
-            <a:ext cx="4482845" cy="3509380"/>
+            <a:off x="14409842" y="19410455"/>
+            <a:ext cx="6398884" cy="5009345"/>
           </a:xfrm>
           <a:prstGeom prst="rect">
             <a:avLst/>
@@ -11137,7 +9006,7 @@
           <p:nvPr/>
         </p:nvPicPr>
         <p:blipFill>
-          <a:blip r:embed="rId19">
+          <a:blip r:embed="rId18">
             <a:extLst>
               <a:ext uri="{28A0092B-C50C-407E-A947-70E740481C1C}">
                 <a14:useLocalDpi xmlns:a14="http://schemas.microsoft.com/office/drawing/2010/main" val="0"/>
@@ -11150,8 +9019,8 @@
         </p:blipFill>
         <p:spPr>
           <a:xfrm>
-            <a:off x="14556396" y="20290604"/>
-            <a:ext cx="6349642" cy="3571674"/>
+            <a:off x="7460878" y="24943026"/>
+            <a:ext cx="6306762" cy="3547554"/>
           </a:xfrm>
           <a:prstGeom prst="rect">
             <a:avLst/>
@@ -11165,21 +9034,146 @@
           <p:nvPr>
             <p:extLst>
               <p:ext uri="{D42A27DB-BD31-4B8C-83A1-F6EECF244321}">
-                <p14:modId xmlns:p14="http://schemas.microsoft.com/office/powerpoint/2010/main" val="1401471547"/>
+                <p14:modId xmlns:p14="http://schemas.microsoft.com/office/powerpoint/2010/main" val="469951144"/>
               </p:ext>
             </p:extLst>
           </p:nvPr>
         </p:nvGraphicFramePr>
         <p:xfrm>
-          <a:off x="211358" y="17948549"/>
+          <a:off x="253901" y="16539245"/>
           <a:ext cx="20720716" cy="1235401"/>
         </p:xfrm>
         <a:graphic>
           <a:graphicData uri="http://schemas.openxmlformats.org/drawingml/2006/diagram">
-            <dgm:relIds xmlns:dgm="http://schemas.openxmlformats.org/drawingml/2006/diagram" xmlns:r="http://schemas.openxmlformats.org/officeDocument/2006/relationships" r:dm="rId20" r:lo="rId21" r:qs="rId22" r:cs="rId23"/>
+            <dgm:relIds xmlns:dgm="http://schemas.openxmlformats.org/drawingml/2006/diagram" xmlns:r="http://schemas.openxmlformats.org/officeDocument/2006/relationships" r:dm="rId19" r:lo="rId20" r:qs="rId21" r:cs="rId22"/>
           </a:graphicData>
         </a:graphic>
       </p:graphicFrame>
+      <p:sp>
+        <p:nvSpPr>
+          <p:cNvPr id="6" name="Textfeld 5"/>
+          <p:cNvSpPr txBox="1"/>
+          <p:nvPr/>
+        </p:nvSpPr>
+        <p:spPr>
+          <a:xfrm>
+            <a:off x="14529502" y="7933263"/>
+            <a:ext cx="6245607" cy="2246769"/>
+          </a:xfrm>
+          <a:prstGeom prst="rect">
+            <a:avLst/>
+          </a:prstGeom>
+          <a:noFill/>
+        </p:spPr>
+        <p:txBody>
+          <a:bodyPr wrap="square" rtlCol="0">
+            <a:spAutoFit/>
+          </a:bodyPr>
+          <a:lstStyle/>
+          <a:p>
+            <a:r>
+              <a:rPr lang="de-DE" sz="2800" dirty="0">
+                <a:latin typeface="Arial" panose="020B0604020202020204" pitchFamily="34" charset="0"/>
+                <a:cs typeface="Arial" panose="020B0604020202020204" pitchFamily="34" charset="0"/>
+              </a:rPr>
+              <a:t>Praktikum der Veranstaltung Fortgeschrittene Softwaretechnologie Verbundstudium </a:t>
+            </a:r>
+          </a:p>
+          <a:p>
+            <a:r>
+              <a:rPr lang="de-DE" sz="2800" dirty="0">
+                <a:latin typeface="Arial" panose="020B0604020202020204" pitchFamily="34" charset="0"/>
+                <a:cs typeface="Arial" panose="020B0604020202020204" pitchFamily="34" charset="0"/>
+              </a:rPr>
+              <a:t>Wirtschaftsinformatik Master</a:t>
+            </a:r>
+          </a:p>
+          <a:p>
+            <a:r>
+              <a:rPr lang="de-DE" sz="2800" dirty="0">
+                <a:latin typeface="Arial" panose="020B0604020202020204" pitchFamily="34" charset="0"/>
+                <a:cs typeface="Arial" panose="020B0604020202020204" pitchFamily="34" charset="0"/>
+              </a:rPr>
+              <a:t>Sommersemester 2017</a:t>
+            </a:r>
+          </a:p>
+        </p:txBody>
+      </p:sp>
+      <p:sp>
+        <p:nvSpPr>
+          <p:cNvPr id="13" name="Textfeld 12"/>
+          <p:cNvSpPr txBox="1"/>
+          <p:nvPr/>
+        </p:nvSpPr>
+        <p:spPr>
+          <a:xfrm>
+            <a:off x="14825046" y="2997675"/>
+            <a:ext cx="2484825" cy="769441"/>
+          </a:xfrm>
+          <a:prstGeom prst="rect">
+            <a:avLst/>
+          </a:prstGeom>
+          <a:noFill/>
+        </p:spPr>
+        <p:txBody>
+          <a:bodyPr wrap="square" rtlCol="0">
+            <a:spAutoFit/>
+          </a:bodyPr>
+          <a:lstStyle/>
+          <a:p>
+            <a:r>
+              <a:rPr lang="de-DE" sz="4400" b="1" dirty="0"/>
+              <a:t>Anbieter:</a:t>
+            </a:r>
+          </a:p>
+        </p:txBody>
+      </p:sp>
+      <p:sp>
+        <p:nvSpPr>
+          <p:cNvPr id="18" name="Rechteck 17"/>
+          <p:cNvSpPr/>
+          <p:nvPr/>
+        </p:nvSpPr>
+        <p:spPr>
+          <a:xfrm>
+            <a:off x="242216" y="11305307"/>
+            <a:ext cx="13707674" cy="449152"/>
+          </a:xfrm>
+          <a:prstGeom prst="rect">
+            <a:avLst/>
+          </a:prstGeom>
+          <a:solidFill>
+            <a:srgbClr val="515151"/>
+          </a:solidFill>
+          <a:ln>
+            <a:noFill/>
+          </a:ln>
+        </p:spPr>
+        <p:style>
+          <a:lnRef idx="2">
+            <a:schemeClr val="accent1">
+              <a:shade val="50000"/>
+            </a:schemeClr>
+          </a:lnRef>
+          <a:fillRef idx="1">
+            <a:schemeClr val="accent1"/>
+          </a:fillRef>
+          <a:effectRef idx="0">
+            <a:schemeClr val="accent1"/>
+          </a:effectRef>
+          <a:fontRef idx="minor">
+            <a:schemeClr val="lt1"/>
+          </a:fontRef>
+        </p:style>
+        <p:txBody>
+          <a:bodyPr rtlCol="0" anchor="ctr"/>
+          <a:lstStyle/>
+          <a:p>
+            <a:pPr algn="ctr"/>
+            <a:endParaRPr lang="de-DE"/>
+          </a:p>
+        </p:txBody>
+      </p:sp>
     </p:spTree>
     <p:extLst>
       <p:ext uri="{BB962C8B-B14F-4D97-AF65-F5344CB8AC3E}">

</xml_diff>

<commit_message>
kleine Formatänderung Klassendiagramm+ Version mit Bildern
</commit_message>
<xml_diff>
--- a/FST17_M4_PosterHoch_T04.pptx
+++ b/FST17_M4_PosterHoch_T04.pptx
@@ -1604,7 +1604,7 @@
   <dgm:whole/>
   <dgm:extLst>
     <a:ext uri="http://schemas.microsoft.com/office/drawing/2008/diagram">
-      <dsp:dataModelExt xmlns:dsp="http://schemas.microsoft.com/office/drawing/2008/diagram" relId="rId23" minVer="http://schemas.openxmlformats.org/drawingml/2006/diagram"/>
+      <dsp:dataModelExt xmlns:dsp="http://schemas.microsoft.com/office/drawing/2008/diagram" relId="rId22" minVer="http://schemas.openxmlformats.org/drawingml/2006/diagram"/>
     </a:ext>
     <a:ext uri="{C62137D5-CB1D-491B-B009-E17868A290BF}">
       <dgm14:recolorImg xmlns:dgm14="http://schemas.microsoft.com/office/drawing/2010/diagram" val="1"/>
@@ -7992,7 +7992,7 @@
         </p:nvSpPr>
         <p:spPr>
           <a:xfrm>
-            <a:off x="14409842" y="23969423"/>
+            <a:off x="14450127" y="23909376"/>
             <a:ext cx="6407027" cy="369332"/>
           </a:xfrm>
           <a:prstGeom prst="rect">
@@ -8030,7 +8030,7 @@
         </p:nvSpPr>
         <p:spPr>
           <a:xfrm>
-            <a:off x="14384645" y="24289974"/>
+            <a:off x="14414066" y="24289897"/>
             <a:ext cx="6449278" cy="984885"/>
           </a:xfrm>
           <a:prstGeom prst="rect">
@@ -8974,36 +8974,6 @@
       </p:pic>
       <p:pic>
         <p:nvPicPr>
-          <p:cNvPr id="27" name="Grafik 26"/>
-          <p:cNvPicPr>
-            <a:picLocks noChangeAspect="1"/>
-          </p:cNvPicPr>
-          <p:nvPr/>
-        </p:nvPicPr>
-        <p:blipFill>
-          <a:blip r:embed="rId17" cstate="print">
-            <a:extLst>
-              <a:ext uri="{28A0092B-C50C-407E-A947-70E740481C1C}">
-                <a14:useLocalDpi xmlns:a14="http://schemas.microsoft.com/office/drawing/2010/main" val="0"/>
-              </a:ext>
-            </a:extLst>
-          </a:blip>
-          <a:stretch>
-            <a:fillRect/>
-          </a:stretch>
-        </p:blipFill>
-        <p:spPr>
-          <a:xfrm>
-            <a:off x="14452863" y="18937798"/>
-            <a:ext cx="6398884" cy="5009345"/>
-          </a:xfrm>
-          <a:prstGeom prst="rect">
-            <a:avLst/>
-          </a:prstGeom>
-        </p:spPr>
-      </p:pic>
-      <p:pic>
-        <p:nvPicPr>
           <p:cNvPr id="37" name="Grafik 36"/>
           <p:cNvPicPr>
             <a:picLocks noChangeAspect="1"/>
@@ -9011,7 +8981,7 @@
           <p:nvPr/>
         </p:nvPicPr>
         <p:blipFill>
-          <a:blip r:embed="rId18">
+          <a:blip r:embed="rId17">
             <a:extLst>
               <a:ext uri="{28A0092B-C50C-407E-A947-70E740481C1C}">
                 <a14:useLocalDpi xmlns:a14="http://schemas.microsoft.com/office/drawing/2010/main" val="0"/>
@@ -9050,7 +9020,7 @@
         </p:xfrm>
         <a:graphic>
           <a:graphicData uri="http://schemas.openxmlformats.org/drawingml/2006/diagram">
-            <dgm:relIds xmlns:dgm="http://schemas.openxmlformats.org/drawingml/2006/diagram" xmlns:r="http://schemas.openxmlformats.org/officeDocument/2006/relationships" r:dm="rId19" r:lo="rId20" r:qs="rId21" r:cs="rId22"/>
+            <dgm:relIds xmlns:dgm="http://schemas.openxmlformats.org/drawingml/2006/diagram" xmlns:r="http://schemas.openxmlformats.org/officeDocument/2006/relationships" r:dm="rId18" r:lo="rId19" r:qs="rId20" r:cs="rId21"/>
           </a:graphicData>
         </a:graphic>
       </p:graphicFrame>
@@ -9188,7 +9158,7 @@
           <p:nvPr/>
         </p:nvPicPr>
         <p:blipFill>
-          <a:blip r:embed="rId24" cstate="print">
+          <a:blip r:embed="rId23" cstate="print">
             <a:extLst>
               <a:ext uri="{28A0092B-C50C-407E-A947-70E740481C1C}">
                 <a14:useLocalDpi xmlns:a14="http://schemas.microsoft.com/office/drawing/2010/main" val="0"/>
@@ -9218,7 +9188,7 @@
           <p:nvPr/>
         </p:nvPicPr>
         <p:blipFill>
-          <a:blip r:embed="rId25">
+          <a:blip r:embed="rId24">
             <a:extLst>
               <a:ext uri="{28A0092B-C50C-407E-A947-70E740481C1C}">
                 <a14:useLocalDpi xmlns:a14="http://schemas.microsoft.com/office/drawing/2010/main" val="0"/>
@@ -9248,7 +9218,7 @@
           <p:nvPr/>
         </p:nvPicPr>
         <p:blipFill>
-          <a:blip r:embed="rId26">
+          <a:blip r:embed="rId25">
             <a:extLst>
               <a:ext uri="{28A0092B-C50C-407E-A947-70E740481C1C}">
                 <a14:useLocalDpi xmlns:a14="http://schemas.microsoft.com/office/drawing/2010/main" val="0"/>
@@ -9278,7 +9248,7 @@
           <p:nvPr/>
         </p:nvPicPr>
         <p:blipFill>
-          <a:blip r:embed="rId27">
+          <a:blip r:embed="rId26">
             <a:extLst>
               <a:ext uri="{28A0092B-C50C-407E-A947-70E740481C1C}">
                 <a14:useLocalDpi xmlns:a14="http://schemas.microsoft.com/office/drawing/2010/main" val="0"/>
@@ -9291,7 +9261,7 @@
         </p:blipFill>
         <p:spPr>
           <a:xfrm>
-            <a:off x="18869571" y="26608214"/>
+            <a:off x="18784463" y="26606641"/>
             <a:ext cx="1984523" cy="826885"/>
           </a:xfrm>
           <a:prstGeom prst="rect">
@@ -9308,7 +9278,7 @@
           <p:nvPr/>
         </p:nvPicPr>
         <p:blipFill>
-          <a:blip r:embed="rId28" cstate="print">
+          <a:blip r:embed="rId27" cstate="print">
             <a:extLst>
               <a:ext uri="{28A0092B-C50C-407E-A947-70E740481C1C}">
                 <a14:useLocalDpi xmlns:a14="http://schemas.microsoft.com/office/drawing/2010/main" val="0"/>
@@ -9338,13 +9308,13 @@
           <p:nvPr/>
         </p:nvPicPr>
         <p:blipFill>
-          <a:blip r:embed="rId29" cstate="print">
+          <a:blip r:embed="rId28" cstate="print">
             <a:extLst>
               <a:ext uri="{28A0092B-C50C-407E-A947-70E740481C1C}">
                 <a14:useLocalDpi xmlns:a14="http://schemas.microsoft.com/office/drawing/2010/main" val="0"/>
               </a:ext>
               <a:ext uri="{96DAC541-7B7A-43D3-8B79-37D633B846F1}">
-                <asvg:svgBlip xmlns:asvg="http://schemas.microsoft.com/office/drawing/2016/SVG/main" r:embed="rId30"/>
+                <asvg:svgBlip xmlns:asvg="http://schemas.microsoft.com/office/drawing/2016/SVG/main" r:embed="rId29"/>
               </a:ext>
             </a:extLst>
           </a:blip>
@@ -9354,7 +9324,7 @@
         </p:blipFill>
         <p:spPr>
           <a:xfrm>
-            <a:off x="16210168" y="26694515"/>
+            <a:off x="16213358" y="26695704"/>
             <a:ext cx="2425112" cy="658660"/>
           </a:xfrm>
           <a:prstGeom prst="rect">
@@ -9371,7 +9341,7 @@
           <p:nvPr/>
         </p:nvPicPr>
         <p:blipFill>
-          <a:blip r:embed="rId31">
+          <a:blip r:embed="rId30">
             <a:extLst>
               <a:ext uri="{28A0092B-C50C-407E-A947-70E740481C1C}">
                 <a14:useLocalDpi xmlns:a14="http://schemas.microsoft.com/office/drawing/2010/main" val="0"/>
@@ -9401,7 +9371,7 @@
           <p:nvPr/>
         </p:nvPicPr>
         <p:blipFill rotWithShape="1">
-          <a:blip r:embed="rId32">
+          <a:blip r:embed="rId31">
             <a:extLst>
               <a:ext uri="{28A0092B-C50C-407E-A947-70E740481C1C}">
                 <a14:useLocalDpi xmlns:a14="http://schemas.microsoft.com/office/drawing/2010/main" val="0"/>
@@ -9430,7 +9400,7 @@
           <p:nvPr/>
         </p:nvPicPr>
         <p:blipFill>
-          <a:blip r:embed="rId33" cstate="print">
+          <a:blip r:embed="rId32" cstate="print">
             <a:extLst>
               <a:ext uri="{28A0092B-C50C-407E-A947-70E740481C1C}">
                 <a14:useLocalDpi xmlns:a14="http://schemas.microsoft.com/office/drawing/2010/main" val="0"/>
@@ -9445,6 +9415,36 @@
           <a:xfrm>
             <a:off x="18869571" y="25381330"/>
             <a:ext cx="1947298" cy="973649"/>
+          </a:xfrm>
+          <a:prstGeom prst="rect">
+            <a:avLst/>
+          </a:prstGeom>
+        </p:spPr>
+      </p:pic>
+      <p:pic>
+        <p:nvPicPr>
+          <p:cNvPr id="59" name="Grafik 58"/>
+          <p:cNvPicPr>
+            <a:picLocks noChangeAspect="1"/>
+          </p:cNvPicPr>
+          <p:nvPr/>
+        </p:nvPicPr>
+        <p:blipFill>
+          <a:blip r:embed="rId33" cstate="print">
+            <a:extLst>
+              <a:ext uri="{28A0092B-C50C-407E-A947-70E740481C1C}">
+                <a14:useLocalDpi xmlns:a14="http://schemas.microsoft.com/office/drawing/2010/main" val="0"/>
+              </a:ext>
+            </a:extLst>
+          </a:blip>
+          <a:stretch>
+            <a:fillRect/>
+          </a:stretch>
+        </p:blipFill>
+        <p:spPr>
+          <a:xfrm>
+            <a:off x="14449582" y="18937798"/>
+            <a:ext cx="6319404" cy="4947124"/>
           </a:xfrm>
           <a:prstGeom prst="rect">
             <a:avLst/>

</xml_diff>